<commit_message>
MAJ Diapo revue 3
</commit_message>
<xml_diff>
--- a/oral_projet/revue_3/diaporama_revue_3_dylan.pptx
+++ b/oral_projet/revue_3/diaporama_revue_3_dylan.pptx
@@ -9603,6 +9603,99 @@
             <a:r>
               <a:rPr lang="fr-FR" dirty="0"/>
               <a:t>4</a:t>
+            </a:r>
+          </a:p>
+        </p:txBody>
+      </p:sp>
+      <p:pic>
+        <p:nvPicPr>
+          <p:cNvPr id="3" name="Image 2">
+            <a:extLst>
+              <a:ext uri="{FF2B5EF4-FFF2-40B4-BE49-F238E27FC236}">
+                <a16:creationId xmlns:a16="http://schemas.microsoft.com/office/drawing/2014/main" id="{EA23733E-9C0F-41D9-B1D7-01F072A62E7A}"/>
+              </a:ext>
+            </a:extLst>
+          </p:cNvPr>
+          <p:cNvPicPr>
+            <a:picLocks noChangeAspect="1"/>
+          </p:cNvPicPr>
+          <p:nvPr/>
+        </p:nvPicPr>
+        <p:blipFill rotWithShape="1">
+          <a:blip r:embed="rId4"/>
+          <a:srcRect b="71632"/>
+          <a:stretch/>
+        </p:blipFill>
+        <p:spPr>
+          <a:xfrm>
+            <a:off x="369115" y="2466172"/>
+            <a:ext cx="5585404" cy="1925656"/>
+          </a:xfrm>
+          <a:prstGeom prst="rect">
+            <a:avLst/>
+          </a:prstGeom>
+        </p:spPr>
+      </p:pic>
+      <p:pic>
+        <p:nvPicPr>
+          <p:cNvPr id="4" name="Image 3">
+            <a:extLst>
+              <a:ext uri="{FF2B5EF4-FFF2-40B4-BE49-F238E27FC236}">
+                <a16:creationId xmlns:a16="http://schemas.microsoft.com/office/drawing/2014/main" id="{79A434E9-D575-41CD-87CE-4F4D444F3E04}"/>
+              </a:ext>
+            </a:extLst>
+          </p:cNvPr>
+          <p:cNvPicPr>
+            <a:picLocks noChangeAspect="1"/>
+          </p:cNvPicPr>
+          <p:nvPr/>
+        </p:nvPicPr>
+        <p:blipFill rotWithShape="1">
+          <a:blip r:embed="rId4"/>
+          <a:srcRect t="31171" r="-4"/>
+          <a:stretch/>
+        </p:blipFill>
+        <p:spPr>
+          <a:xfrm>
+            <a:off x="6096000" y="1540926"/>
+            <a:ext cx="5643098" cy="4720268"/>
+          </a:xfrm>
+          <a:prstGeom prst="rect">
+            <a:avLst/>
+          </a:prstGeom>
+        </p:spPr>
+      </p:pic>
+      <p:sp>
+        <p:nvSpPr>
+          <p:cNvPr id="5" name="ZoneTexte 4">
+            <a:extLst>
+              <a:ext uri="{FF2B5EF4-FFF2-40B4-BE49-F238E27FC236}">
+                <a16:creationId xmlns:a16="http://schemas.microsoft.com/office/drawing/2014/main" id="{46253BB2-77E2-43A5-9B69-EF802C2CE305}"/>
+              </a:ext>
+            </a:extLst>
+          </p:cNvPr>
+          <p:cNvSpPr txBox="1"/>
+          <p:nvPr/>
+        </p:nvSpPr>
+        <p:spPr>
+          <a:xfrm>
+            <a:off x="452674" y="4698749"/>
+            <a:ext cx="5501845" cy="584775"/>
+          </a:xfrm>
+          <a:prstGeom prst="rect">
+            <a:avLst/>
+          </a:prstGeom>
+          <a:noFill/>
+        </p:spPr>
+        <p:txBody>
+          <a:bodyPr wrap="square" rtlCol="0">
+            <a:spAutoFit/>
+          </a:bodyPr>
+          <a:lstStyle/>
+          <a:p>
+            <a:r>
+              <a:rPr lang="fr-FR" sz="1600" i="1" dirty="0"/>
+              <a:t>Extrait du cahier de recette « Envoyer les données correspondantes à la pluviométrie</a:t>
             </a:r>
           </a:p>
         </p:txBody>

</xml_diff>

<commit_message>
MAJ Diapo revu 3
</commit_message>
<xml_diff>
--- a/oral_projet/revue_3/diaporama_revue_3_dylan.pptx
+++ b/oral_projet/revue_3/diaporama_revue_3_dylan.pptx
@@ -5,7 +5,7 @@
     <p:sldMasterId id="2147483648" r:id="rId1"/>
   </p:sldMasterIdLst>
   <p:notesMasterIdLst>
-    <p:notesMasterId r:id="rId9"/>
+    <p:notesMasterId r:id="rId11"/>
   </p:notesMasterIdLst>
   <p:sldIdLst>
     <p:sldId id="256" r:id="rId2"/>
@@ -15,6 +15,8 @@
     <p:sldId id="263" r:id="rId6"/>
     <p:sldId id="264" r:id="rId7"/>
     <p:sldId id="265" r:id="rId8"/>
+    <p:sldId id="266" r:id="rId9"/>
+    <p:sldId id="267" r:id="rId10"/>
   </p:sldIdLst>
   <p:sldSz cx="12192000" cy="6858000"/>
   <p:notesSz cx="6858000" cy="9144000"/>
@@ -5347,7 +5349,7 @@
         <p:spPr>
           <a:xfrm>
             <a:off x="1299735" y="2644170"/>
-            <a:ext cx="4796264" cy="1938992"/>
+            <a:ext cx="4796264" cy="2677656"/>
           </a:xfrm>
           <a:prstGeom prst="rect">
             <a:avLst/>
@@ -5406,13 +5408,28 @@
             </a:pPr>
             <a:r>
               <a:rPr lang="fr-FR" sz="2400" dirty="0"/>
-              <a:t>Schéma de </a:t>
+              <a:t>Schéma de câblage</a:t>
             </a:r>
+          </a:p>
+          <a:p>
+            <a:pPr marL="285750" indent="-285750">
+              <a:buFont typeface="Arial" panose="020B0604020202020204" pitchFamily="34" charset="0"/>
+              <a:buChar char="•"/>
+            </a:pPr>
             <a:r>
-              <a:rPr lang="fr-FR" sz="2400" dirty="0" err="1"/>
-              <a:t>cablage</a:t>
+              <a:rPr lang="fr-FR" sz="2400" dirty="0"/>
+              <a:t>Application Android</a:t>
             </a:r>
-            <a:endParaRPr lang="fr-FR" sz="2400" dirty="0"/>
+          </a:p>
+          <a:p>
+            <a:pPr marL="285750" indent="-285750">
+              <a:buFont typeface="Arial" panose="020B0604020202020204" pitchFamily="34" charset="0"/>
+              <a:buChar char="•"/>
+            </a:pPr>
+            <a:r>
+              <a:rPr lang="fr-FR" sz="2400" dirty="0"/>
+              <a:t>Test unitaires</a:t>
+            </a:r>
           </a:p>
         </p:txBody>
       </p:sp>
@@ -10568,10 +10585,2607 @@
           </a:p>
         </p:txBody>
       </p:sp>
+      <p:pic>
+        <p:nvPicPr>
+          <p:cNvPr id="6" name="Image 5">
+            <a:extLst>
+              <a:ext uri="{FF2B5EF4-FFF2-40B4-BE49-F238E27FC236}">
+                <a16:creationId xmlns:a16="http://schemas.microsoft.com/office/drawing/2014/main" id="{6D2218C6-C5CD-42B9-A39C-7EE2FA825F73}"/>
+              </a:ext>
+            </a:extLst>
+          </p:cNvPr>
+          <p:cNvPicPr>
+            <a:picLocks noChangeAspect="1"/>
+          </p:cNvPicPr>
+          <p:nvPr/>
+        </p:nvPicPr>
+        <p:blipFill>
+          <a:blip r:embed="rId4">
+            <a:extLst>
+              <a:ext uri="{28A0092B-C50C-407E-A947-70E740481C1C}">
+                <a14:useLocalDpi xmlns:a14="http://schemas.microsoft.com/office/drawing/2010/main" val="0"/>
+              </a:ext>
+            </a:extLst>
+          </a:blip>
+          <a:stretch>
+            <a:fillRect/>
+          </a:stretch>
+        </p:blipFill>
+        <p:spPr>
+          <a:xfrm>
+            <a:off x="48889" y="0"/>
+            <a:ext cx="11878147" cy="6326226"/>
+          </a:xfrm>
+          <a:prstGeom prst="rect">
+            <a:avLst/>
+          </a:prstGeom>
+        </p:spPr>
+      </p:pic>
+      <p:sp>
+        <p:nvSpPr>
+          <p:cNvPr id="7" name="ZoneTexte 6">
+            <a:extLst>
+              <a:ext uri="{FF2B5EF4-FFF2-40B4-BE49-F238E27FC236}">
+                <a16:creationId xmlns:a16="http://schemas.microsoft.com/office/drawing/2014/main" id="{576F8507-5DF6-48C0-B58E-23A9FA051E5F}"/>
+              </a:ext>
+            </a:extLst>
+          </p:cNvPr>
+          <p:cNvSpPr txBox="1"/>
+          <p:nvPr/>
+        </p:nvSpPr>
+        <p:spPr>
+          <a:xfrm>
+            <a:off x="3927586" y="5810715"/>
+            <a:ext cx="4336828" cy="369332"/>
+          </a:xfrm>
+          <a:prstGeom prst="rect">
+            <a:avLst/>
+          </a:prstGeom>
+          <a:noFill/>
+        </p:spPr>
+        <p:txBody>
+          <a:bodyPr wrap="none" rtlCol="0">
+            <a:spAutoFit/>
+          </a:bodyPr>
+          <a:lstStyle/>
+          <a:p>
+            <a:r>
+              <a:rPr lang="fr-FR" i="1" dirty="0">
+                <a:solidFill>
+                  <a:schemeClr val="tx1">
+                    <a:lumMod val="50000"/>
+                    <a:lumOff val="50000"/>
+                  </a:schemeClr>
+                </a:solidFill>
+              </a:rPr>
+              <a:t>Schéma de câblage : Arduino et pluviomètre</a:t>
+            </a:r>
+          </a:p>
+        </p:txBody>
+      </p:sp>
     </p:spTree>
     <p:extLst>
       <p:ext uri="{BB962C8B-B14F-4D97-AF65-F5344CB8AC3E}">
         <p14:creationId xmlns:p14="http://schemas.microsoft.com/office/powerpoint/2010/main" val="4293470173"/>
+      </p:ext>
+    </p:extLst>
+  </p:cSld>
+  <p:clrMapOvr>
+    <a:masterClrMapping/>
+  </p:clrMapOvr>
+  <mc:AlternateContent xmlns:mc="http://schemas.openxmlformats.org/markup-compatibility/2006" xmlns:p14="http://schemas.microsoft.com/office/powerpoint/2010/main">
+    <mc:Choice Requires="p14">
+      <p:transition spd="slow">
+        <p14:reveal/>
+      </p:transition>
+    </mc:Choice>
+    <mc:Fallback xmlns="">
+      <p:transition spd="slow">
+        <p:fade/>
+      </p:transition>
+    </mc:Fallback>
+  </mc:AlternateContent>
+</p:sld>
+</file>
+
+<file path=ppt/slides/slide8.xml><?xml version="1.0" encoding="utf-8"?>
+<p:sld xmlns:a="http://schemas.openxmlformats.org/drawingml/2006/main" xmlns:r="http://schemas.openxmlformats.org/officeDocument/2006/relationships" xmlns:p="http://schemas.openxmlformats.org/presentationml/2006/main">
+  <p:cSld>
+    <p:spTree>
+      <p:nvGrpSpPr>
+        <p:cNvPr id="1" name=""/>
+        <p:cNvGrpSpPr/>
+        <p:nvPr/>
+      </p:nvGrpSpPr>
+      <p:grpSpPr>
+        <a:xfrm>
+          <a:off x="0" y="0"/>
+          <a:ext cx="0" cy="0"/>
+          <a:chOff x="0" y="0"/>
+          <a:chExt cx="0" cy="0"/>
+        </a:xfrm>
+      </p:grpSpPr>
+      <p:pic>
+        <p:nvPicPr>
+          <p:cNvPr id="8" name="Image 7">
+            <a:extLst>
+              <a:ext uri="{FF2B5EF4-FFF2-40B4-BE49-F238E27FC236}">
+                <a16:creationId xmlns:a16="http://schemas.microsoft.com/office/drawing/2014/main" id="{2BB825C5-31DA-4A56-85EA-536DBF510A31}"/>
+              </a:ext>
+            </a:extLst>
+          </p:cNvPr>
+          <p:cNvPicPr>
+            <a:picLocks noChangeAspect="1"/>
+          </p:cNvPicPr>
+          <p:nvPr/>
+        </p:nvPicPr>
+        <p:blipFill>
+          <a:blip r:embed="rId2">
+            <a:extLst>
+              <a:ext uri="{28A0092B-C50C-407E-A947-70E740481C1C}">
+                <a14:useLocalDpi xmlns:a14="http://schemas.microsoft.com/office/drawing/2010/main" val="0"/>
+              </a:ext>
+            </a:extLst>
+          </a:blip>
+          <a:stretch>
+            <a:fillRect/>
+          </a:stretch>
+        </p:blipFill>
+        <p:spPr>
+          <a:xfrm>
+            <a:off x="1068751" y="66457"/>
+            <a:ext cx="1259497" cy="776690"/>
+          </a:xfrm>
+          <a:prstGeom prst="rect">
+            <a:avLst/>
+          </a:prstGeom>
+        </p:spPr>
+      </p:pic>
+      <p:pic>
+        <p:nvPicPr>
+          <p:cNvPr id="10" name="Image 9">
+            <a:extLst>
+              <a:ext uri="{FF2B5EF4-FFF2-40B4-BE49-F238E27FC236}">
+                <a16:creationId xmlns:a16="http://schemas.microsoft.com/office/drawing/2014/main" id="{8EE7436F-49F2-41E0-93E4-D247B4705294}"/>
+              </a:ext>
+            </a:extLst>
+          </p:cNvPr>
+          <p:cNvPicPr>
+            <a:picLocks noChangeAspect="1"/>
+          </p:cNvPicPr>
+          <p:nvPr/>
+        </p:nvPicPr>
+        <p:blipFill>
+          <a:blip r:embed="rId3">
+            <a:extLst>
+              <a:ext uri="{28A0092B-C50C-407E-A947-70E740481C1C}">
+                <a14:useLocalDpi xmlns:a14="http://schemas.microsoft.com/office/drawing/2010/main" val="0"/>
+              </a:ext>
+            </a:extLst>
+          </a:blip>
+          <a:stretch>
+            <a:fillRect/>
+          </a:stretch>
+        </p:blipFill>
+        <p:spPr>
+          <a:xfrm>
+            <a:off x="9681085" y="238153"/>
+            <a:ext cx="1802101" cy="569807"/>
+          </a:xfrm>
+          <a:prstGeom prst="rect">
+            <a:avLst/>
+          </a:prstGeom>
+        </p:spPr>
+      </p:pic>
+      <p:cxnSp>
+        <p:nvCxnSpPr>
+          <p:cNvPr id="16" name="Connecteur droit 15">
+            <a:extLst>
+              <a:ext uri="{FF2B5EF4-FFF2-40B4-BE49-F238E27FC236}">
+                <a16:creationId xmlns:a16="http://schemas.microsoft.com/office/drawing/2014/main" id="{7319284A-BD6F-4A96-8E2B-E0A4B52E53C6}"/>
+              </a:ext>
+            </a:extLst>
+          </p:cNvPr>
+          <p:cNvCxnSpPr>
+            <a:cxnSpLocks/>
+          </p:cNvCxnSpPr>
+          <p:nvPr/>
+        </p:nvCxnSpPr>
+        <p:spPr>
+          <a:xfrm flipV="1">
+            <a:off x="0" y="454803"/>
+            <a:ext cx="738231" cy="1798"/>
+          </a:xfrm>
+          <a:prstGeom prst="line">
+            <a:avLst/>
+          </a:prstGeom>
+        </p:spPr>
+        <p:style>
+          <a:lnRef idx="3">
+            <a:schemeClr val="dk1"/>
+          </a:lnRef>
+          <a:fillRef idx="0">
+            <a:schemeClr val="dk1"/>
+          </a:fillRef>
+          <a:effectRef idx="2">
+            <a:schemeClr val="dk1"/>
+          </a:effectRef>
+          <a:fontRef idx="minor">
+            <a:schemeClr val="tx1"/>
+          </a:fontRef>
+        </p:style>
+      </p:cxnSp>
+      <p:cxnSp>
+        <p:nvCxnSpPr>
+          <p:cNvPr id="20" name="Connecteur droit 19">
+            <a:extLst>
+              <a:ext uri="{FF2B5EF4-FFF2-40B4-BE49-F238E27FC236}">
+                <a16:creationId xmlns:a16="http://schemas.microsoft.com/office/drawing/2014/main" id="{08874CF7-F149-4C81-B61E-74E18342BA8A}"/>
+              </a:ext>
+            </a:extLst>
+          </p:cNvPr>
+          <p:cNvCxnSpPr>
+            <a:cxnSpLocks/>
+          </p:cNvCxnSpPr>
+          <p:nvPr/>
+        </p:nvCxnSpPr>
+        <p:spPr>
+          <a:xfrm>
+            <a:off x="2573222" y="454803"/>
+            <a:ext cx="6829482" cy="10398"/>
+          </a:xfrm>
+          <a:prstGeom prst="line">
+            <a:avLst/>
+          </a:prstGeom>
+        </p:spPr>
+        <p:style>
+          <a:lnRef idx="3">
+            <a:schemeClr val="dk1"/>
+          </a:lnRef>
+          <a:fillRef idx="0">
+            <a:schemeClr val="dk1"/>
+          </a:fillRef>
+          <a:effectRef idx="2">
+            <a:schemeClr val="dk1"/>
+          </a:effectRef>
+          <a:fontRef idx="minor">
+            <a:schemeClr val="tx1"/>
+          </a:fontRef>
+        </p:style>
+      </p:cxnSp>
+      <p:cxnSp>
+        <p:nvCxnSpPr>
+          <p:cNvPr id="26" name="Connecteur droit 25">
+            <a:extLst>
+              <a:ext uri="{FF2B5EF4-FFF2-40B4-BE49-F238E27FC236}">
+                <a16:creationId xmlns:a16="http://schemas.microsoft.com/office/drawing/2014/main" id="{BB3B35CC-057B-48C1-880F-3306A6559175}"/>
+              </a:ext>
+            </a:extLst>
+          </p:cNvPr>
+          <p:cNvCxnSpPr>
+            <a:cxnSpLocks/>
+          </p:cNvCxnSpPr>
+          <p:nvPr/>
+        </p:nvCxnSpPr>
+        <p:spPr>
+          <a:xfrm>
+            <a:off x="738231" y="454803"/>
+            <a:ext cx="344203" cy="484764"/>
+          </a:xfrm>
+          <a:prstGeom prst="line">
+            <a:avLst/>
+          </a:prstGeom>
+        </p:spPr>
+        <p:style>
+          <a:lnRef idx="3">
+            <a:schemeClr val="dk1"/>
+          </a:lnRef>
+          <a:fillRef idx="0">
+            <a:schemeClr val="dk1"/>
+          </a:fillRef>
+          <a:effectRef idx="2">
+            <a:schemeClr val="dk1"/>
+          </a:effectRef>
+          <a:fontRef idx="minor">
+            <a:schemeClr val="tx1"/>
+          </a:fontRef>
+        </p:style>
+      </p:cxnSp>
+      <p:cxnSp>
+        <p:nvCxnSpPr>
+          <p:cNvPr id="32" name="Connecteur droit 31">
+            <a:extLst>
+              <a:ext uri="{FF2B5EF4-FFF2-40B4-BE49-F238E27FC236}">
+                <a16:creationId xmlns:a16="http://schemas.microsoft.com/office/drawing/2014/main" id="{4AD96496-1EB6-4E48-9BB2-5C255495C686}"/>
+              </a:ext>
+            </a:extLst>
+          </p:cNvPr>
+          <p:cNvCxnSpPr>
+            <a:cxnSpLocks/>
+          </p:cNvCxnSpPr>
+          <p:nvPr/>
+        </p:nvCxnSpPr>
+        <p:spPr>
+          <a:xfrm>
+            <a:off x="1082434" y="938268"/>
+            <a:ext cx="1146585" cy="0"/>
+          </a:xfrm>
+          <a:prstGeom prst="line">
+            <a:avLst/>
+          </a:prstGeom>
+        </p:spPr>
+        <p:style>
+          <a:lnRef idx="3">
+            <a:schemeClr val="dk1"/>
+          </a:lnRef>
+          <a:fillRef idx="0">
+            <a:schemeClr val="dk1"/>
+          </a:fillRef>
+          <a:effectRef idx="2">
+            <a:schemeClr val="dk1"/>
+          </a:effectRef>
+          <a:fontRef idx="minor">
+            <a:schemeClr val="tx1"/>
+          </a:fontRef>
+        </p:style>
+      </p:cxnSp>
+      <p:cxnSp>
+        <p:nvCxnSpPr>
+          <p:cNvPr id="51" name="Connecteur droit 50">
+            <a:extLst>
+              <a:ext uri="{FF2B5EF4-FFF2-40B4-BE49-F238E27FC236}">
+                <a16:creationId xmlns:a16="http://schemas.microsoft.com/office/drawing/2014/main" id="{C035BFA6-ECBF-4775-BA81-19D2CA41AA8D}"/>
+              </a:ext>
+            </a:extLst>
+          </p:cNvPr>
+          <p:cNvCxnSpPr>
+            <a:cxnSpLocks/>
+          </p:cNvCxnSpPr>
+          <p:nvPr/>
+        </p:nvCxnSpPr>
+        <p:spPr>
+          <a:xfrm>
+            <a:off x="9402704" y="465201"/>
+            <a:ext cx="344203" cy="495163"/>
+          </a:xfrm>
+          <a:prstGeom prst="line">
+            <a:avLst/>
+          </a:prstGeom>
+        </p:spPr>
+        <p:style>
+          <a:lnRef idx="3">
+            <a:schemeClr val="dk1"/>
+          </a:lnRef>
+          <a:fillRef idx="0">
+            <a:schemeClr val="dk1"/>
+          </a:fillRef>
+          <a:effectRef idx="2">
+            <a:schemeClr val="dk1"/>
+          </a:effectRef>
+          <a:fontRef idx="minor">
+            <a:schemeClr val="tx1"/>
+          </a:fontRef>
+        </p:style>
+      </p:cxnSp>
+      <p:cxnSp>
+        <p:nvCxnSpPr>
+          <p:cNvPr id="52" name="Connecteur droit 51">
+            <a:extLst>
+              <a:ext uri="{FF2B5EF4-FFF2-40B4-BE49-F238E27FC236}">
+                <a16:creationId xmlns:a16="http://schemas.microsoft.com/office/drawing/2014/main" id="{FA310BC7-694B-4984-99A2-61A1F4F6EBF9}"/>
+              </a:ext>
+            </a:extLst>
+          </p:cNvPr>
+          <p:cNvCxnSpPr>
+            <a:cxnSpLocks/>
+          </p:cNvCxnSpPr>
+          <p:nvPr/>
+        </p:nvCxnSpPr>
+        <p:spPr>
+          <a:xfrm flipH="1">
+            <a:off x="11370469" y="448308"/>
+            <a:ext cx="364332" cy="501657"/>
+          </a:xfrm>
+          <a:prstGeom prst="line">
+            <a:avLst/>
+          </a:prstGeom>
+        </p:spPr>
+        <p:style>
+          <a:lnRef idx="3">
+            <a:schemeClr val="dk1"/>
+          </a:lnRef>
+          <a:fillRef idx="0">
+            <a:schemeClr val="dk1"/>
+          </a:fillRef>
+          <a:effectRef idx="2">
+            <a:schemeClr val="dk1"/>
+          </a:effectRef>
+          <a:fontRef idx="minor">
+            <a:schemeClr val="tx1"/>
+          </a:fontRef>
+        </p:style>
+      </p:cxnSp>
+      <p:cxnSp>
+        <p:nvCxnSpPr>
+          <p:cNvPr id="53" name="Connecteur droit 52">
+            <a:extLst>
+              <a:ext uri="{FF2B5EF4-FFF2-40B4-BE49-F238E27FC236}">
+                <a16:creationId xmlns:a16="http://schemas.microsoft.com/office/drawing/2014/main" id="{BE0649BD-EE59-4DDA-960F-95B2572F9F13}"/>
+              </a:ext>
+            </a:extLst>
+          </p:cNvPr>
+          <p:cNvCxnSpPr>
+            <a:cxnSpLocks/>
+          </p:cNvCxnSpPr>
+          <p:nvPr/>
+        </p:nvCxnSpPr>
+        <p:spPr>
+          <a:xfrm>
+            <a:off x="9743203" y="949965"/>
+            <a:ext cx="1627266" cy="0"/>
+          </a:xfrm>
+          <a:prstGeom prst="line">
+            <a:avLst/>
+          </a:prstGeom>
+        </p:spPr>
+        <p:style>
+          <a:lnRef idx="3">
+            <a:schemeClr val="dk1"/>
+          </a:lnRef>
+          <a:fillRef idx="0">
+            <a:schemeClr val="dk1"/>
+          </a:fillRef>
+          <a:effectRef idx="2">
+            <a:schemeClr val="dk1"/>
+          </a:effectRef>
+          <a:fontRef idx="minor">
+            <a:schemeClr val="tx1"/>
+          </a:fontRef>
+        </p:style>
+      </p:cxnSp>
+      <p:cxnSp>
+        <p:nvCxnSpPr>
+          <p:cNvPr id="55" name="Connecteur droit 54">
+            <a:extLst>
+              <a:ext uri="{FF2B5EF4-FFF2-40B4-BE49-F238E27FC236}">
+                <a16:creationId xmlns:a16="http://schemas.microsoft.com/office/drawing/2014/main" id="{52AA9200-DAFA-4EEF-AC13-4C7CE82A59EC}"/>
+              </a:ext>
+            </a:extLst>
+          </p:cNvPr>
+          <p:cNvCxnSpPr>
+            <a:cxnSpLocks/>
+          </p:cNvCxnSpPr>
+          <p:nvPr/>
+        </p:nvCxnSpPr>
+        <p:spPr>
+          <a:xfrm>
+            <a:off x="11715750" y="454801"/>
+            <a:ext cx="476249" cy="10400"/>
+          </a:xfrm>
+          <a:prstGeom prst="line">
+            <a:avLst/>
+          </a:prstGeom>
+        </p:spPr>
+        <p:style>
+          <a:lnRef idx="3">
+            <a:schemeClr val="dk1"/>
+          </a:lnRef>
+          <a:fillRef idx="0">
+            <a:schemeClr val="dk1"/>
+          </a:fillRef>
+          <a:effectRef idx="2">
+            <a:schemeClr val="dk1"/>
+          </a:effectRef>
+          <a:fontRef idx="minor">
+            <a:schemeClr val="tx1"/>
+          </a:fontRef>
+        </p:style>
+      </p:cxnSp>
+      <p:cxnSp>
+        <p:nvCxnSpPr>
+          <p:cNvPr id="23" name="Connecteur droit 22">
+            <a:extLst>
+              <a:ext uri="{FF2B5EF4-FFF2-40B4-BE49-F238E27FC236}">
+                <a16:creationId xmlns:a16="http://schemas.microsoft.com/office/drawing/2014/main" id="{BCB092C8-0080-4E56-957E-0046D4C83988}"/>
+              </a:ext>
+            </a:extLst>
+          </p:cNvPr>
+          <p:cNvCxnSpPr>
+            <a:cxnSpLocks/>
+          </p:cNvCxnSpPr>
+          <p:nvPr/>
+        </p:nvCxnSpPr>
+        <p:spPr>
+          <a:xfrm flipH="1">
+            <a:off x="2216372" y="446356"/>
+            <a:ext cx="364332" cy="501657"/>
+          </a:xfrm>
+          <a:prstGeom prst="line">
+            <a:avLst/>
+          </a:prstGeom>
+        </p:spPr>
+        <p:style>
+          <a:lnRef idx="3">
+            <a:schemeClr val="dk1"/>
+          </a:lnRef>
+          <a:fillRef idx="0">
+            <a:schemeClr val="dk1"/>
+          </a:fillRef>
+          <a:effectRef idx="2">
+            <a:schemeClr val="dk1"/>
+          </a:effectRef>
+          <a:fontRef idx="minor">
+            <a:schemeClr val="tx1"/>
+          </a:fontRef>
+        </p:style>
+      </p:cxnSp>
+      <p:pic>
+        <p:nvPicPr>
+          <p:cNvPr id="57" name="Image 56">
+            <a:extLst>
+              <a:ext uri="{FF2B5EF4-FFF2-40B4-BE49-F238E27FC236}">
+                <a16:creationId xmlns:a16="http://schemas.microsoft.com/office/drawing/2014/main" id="{12B16FB2-5844-4B92-AE69-9BAC858C22BB}"/>
+              </a:ext>
+            </a:extLst>
+          </p:cNvPr>
+          <p:cNvPicPr>
+            <a:picLocks noChangeAspect="1"/>
+          </p:cNvPicPr>
+          <p:nvPr/>
+        </p:nvPicPr>
+        <p:blipFill>
+          <a:blip r:embed="rId3">
+            <a:extLst>
+              <a:ext uri="{28A0092B-C50C-407E-A947-70E740481C1C}">
+                <a14:useLocalDpi xmlns:a14="http://schemas.microsoft.com/office/drawing/2010/main" val="0"/>
+              </a:ext>
+            </a:extLst>
+          </a:blip>
+          <a:stretch>
+            <a:fillRect/>
+          </a:stretch>
+        </p:blipFill>
+        <p:spPr>
+          <a:xfrm>
+            <a:off x="9681085" y="238153"/>
+            <a:ext cx="1802101" cy="569807"/>
+          </a:xfrm>
+          <a:prstGeom prst="rect">
+            <a:avLst/>
+          </a:prstGeom>
+        </p:spPr>
+      </p:pic>
+      <p:cxnSp>
+        <p:nvCxnSpPr>
+          <p:cNvPr id="58" name="Connecteur droit 57">
+            <a:extLst>
+              <a:ext uri="{FF2B5EF4-FFF2-40B4-BE49-F238E27FC236}">
+                <a16:creationId xmlns:a16="http://schemas.microsoft.com/office/drawing/2014/main" id="{01599350-F8B0-4FDC-B003-981189A8D654}"/>
+              </a:ext>
+            </a:extLst>
+          </p:cNvPr>
+          <p:cNvCxnSpPr>
+            <a:cxnSpLocks/>
+          </p:cNvCxnSpPr>
+          <p:nvPr/>
+        </p:nvCxnSpPr>
+        <p:spPr>
+          <a:xfrm>
+            <a:off x="2573222" y="454803"/>
+            <a:ext cx="6829482" cy="10398"/>
+          </a:xfrm>
+          <a:prstGeom prst="line">
+            <a:avLst/>
+          </a:prstGeom>
+        </p:spPr>
+        <p:style>
+          <a:lnRef idx="3">
+            <a:schemeClr val="dk1"/>
+          </a:lnRef>
+          <a:fillRef idx="0">
+            <a:schemeClr val="dk1"/>
+          </a:fillRef>
+          <a:effectRef idx="2">
+            <a:schemeClr val="dk1"/>
+          </a:effectRef>
+          <a:fontRef idx="minor">
+            <a:schemeClr val="tx1"/>
+          </a:fontRef>
+        </p:style>
+      </p:cxnSp>
+      <p:cxnSp>
+        <p:nvCxnSpPr>
+          <p:cNvPr id="59" name="Connecteur droit 58">
+            <a:extLst>
+              <a:ext uri="{FF2B5EF4-FFF2-40B4-BE49-F238E27FC236}">
+                <a16:creationId xmlns:a16="http://schemas.microsoft.com/office/drawing/2014/main" id="{BC6E6150-6054-4785-84EC-0C46D82034C2}"/>
+              </a:ext>
+            </a:extLst>
+          </p:cNvPr>
+          <p:cNvCxnSpPr>
+            <a:cxnSpLocks/>
+          </p:cNvCxnSpPr>
+          <p:nvPr/>
+        </p:nvCxnSpPr>
+        <p:spPr>
+          <a:xfrm>
+            <a:off x="738231" y="454803"/>
+            <a:ext cx="344203" cy="484764"/>
+          </a:xfrm>
+          <a:prstGeom prst="line">
+            <a:avLst/>
+          </a:prstGeom>
+        </p:spPr>
+        <p:style>
+          <a:lnRef idx="3">
+            <a:schemeClr val="dk1"/>
+          </a:lnRef>
+          <a:fillRef idx="0">
+            <a:schemeClr val="dk1"/>
+          </a:fillRef>
+          <a:effectRef idx="2">
+            <a:schemeClr val="dk1"/>
+          </a:effectRef>
+          <a:fontRef idx="minor">
+            <a:schemeClr val="tx1"/>
+          </a:fontRef>
+        </p:style>
+      </p:cxnSp>
+      <p:cxnSp>
+        <p:nvCxnSpPr>
+          <p:cNvPr id="60" name="Connecteur droit 59">
+            <a:extLst>
+              <a:ext uri="{FF2B5EF4-FFF2-40B4-BE49-F238E27FC236}">
+                <a16:creationId xmlns:a16="http://schemas.microsoft.com/office/drawing/2014/main" id="{CBC9961A-8EC2-4287-A398-BCA4138D409D}"/>
+              </a:ext>
+            </a:extLst>
+          </p:cNvPr>
+          <p:cNvCxnSpPr>
+            <a:cxnSpLocks/>
+          </p:cNvCxnSpPr>
+          <p:nvPr/>
+        </p:nvCxnSpPr>
+        <p:spPr>
+          <a:xfrm>
+            <a:off x="1082434" y="938268"/>
+            <a:ext cx="1146585" cy="0"/>
+          </a:xfrm>
+          <a:prstGeom prst="line">
+            <a:avLst/>
+          </a:prstGeom>
+        </p:spPr>
+        <p:style>
+          <a:lnRef idx="3">
+            <a:schemeClr val="dk1"/>
+          </a:lnRef>
+          <a:fillRef idx="0">
+            <a:schemeClr val="dk1"/>
+          </a:fillRef>
+          <a:effectRef idx="2">
+            <a:schemeClr val="dk1"/>
+          </a:effectRef>
+          <a:fontRef idx="minor">
+            <a:schemeClr val="tx1"/>
+          </a:fontRef>
+        </p:style>
+      </p:cxnSp>
+      <p:cxnSp>
+        <p:nvCxnSpPr>
+          <p:cNvPr id="61" name="Connecteur droit 60">
+            <a:extLst>
+              <a:ext uri="{FF2B5EF4-FFF2-40B4-BE49-F238E27FC236}">
+                <a16:creationId xmlns:a16="http://schemas.microsoft.com/office/drawing/2014/main" id="{152B7C45-2543-4665-BC07-4DB71CA9F337}"/>
+              </a:ext>
+            </a:extLst>
+          </p:cNvPr>
+          <p:cNvCxnSpPr>
+            <a:cxnSpLocks/>
+          </p:cNvCxnSpPr>
+          <p:nvPr/>
+        </p:nvCxnSpPr>
+        <p:spPr>
+          <a:xfrm>
+            <a:off x="9402704" y="465201"/>
+            <a:ext cx="344203" cy="495163"/>
+          </a:xfrm>
+          <a:prstGeom prst="line">
+            <a:avLst/>
+          </a:prstGeom>
+        </p:spPr>
+        <p:style>
+          <a:lnRef idx="3">
+            <a:schemeClr val="dk1"/>
+          </a:lnRef>
+          <a:fillRef idx="0">
+            <a:schemeClr val="dk1"/>
+          </a:fillRef>
+          <a:effectRef idx="2">
+            <a:schemeClr val="dk1"/>
+          </a:effectRef>
+          <a:fontRef idx="minor">
+            <a:schemeClr val="tx1"/>
+          </a:fontRef>
+        </p:style>
+      </p:cxnSp>
+      <p:cxnSp>
+        <p:nvCxnSpPr>
+          <p:cNvPr id="62" name="Connecteur droit 61">
+            <a:extLst>
+              <a:ext uri="{FF2B5EF4-FFF2-40B4-BE49-F238E27FC236}">
+                <a16:creationId xmlns:a16="http://schemas.microsoft.com/office/drawing/2014/main" id="{00A84DC3-A112-46A3-B71C-04D85339323D}"/>
+              </a:ext>
+            </a:extLst>
+          </p:cNvPr>
+          <p:cNvCxnSpPr>
+            <a:cxnSpLocks/>
+          </p:cNvCxnSpPr>
+          <p:nvPr/>
+        </p:nvCxnSpPr>
+        <p:spPr>
+          <a:xfrm flipH="1">
+            <a:off x="11370469" y="448308"/>
+            <a:ext cx="364332" cy="501657"/>
+          </a:xfrm>
+          <a:prstGeom prst="line">
+            <a:avLst/>
+          </a:prstGeom>
+        </p:spPr>
+        <p:style>
+          <a:lnRef idx="3">
+            <a:schemeClr val="dk1"/>
+          </a:lnRef>
+          <a:fillRef idx="0">
+            <a:schemeClr val="dk1"/>
+          </a:fillRef>
+          <a:effectRef idx="2">
+            <a:schemeClr val="dk1"/>
+          </a:effectRef>
+          <a:fontRef idx="minor">
+            <a:schemeClr val="tx1"/>
+          </a:fontRef>
+        </p:style>
+      </p:cxnSp>
+      <p:cxnSp>
+        <p:nvCxnSpPr>
+          <p:cNvPr id="63" name="Connecteur droit 62">
+            <a:extLst>
+              <a:ext uri="{FF2B5EF4-FFF2-40B4-BE49-F238E27FC236}">
+                <a16:creationId xmlns:a16="http://schemas.microsoft.com/office/drawing/2014/main" id="{C50788C6-8F68-44EC-AB54-94C1D2FE554D}"/>
+              </a:ext>
+            </a:extLst>
+          </p:cNvPr>
+          <p:cNvCxnSpPr>
+            <a:cxnSpLocks/>
+          </p:cNvCxnSpPr>
+          <p:nvPr/>
+        </p:nvCxnSpPr>
+        <p:spPr>
+          <a:xfrm>
+            <a:off x="9743203" y="949965"/>
+            <a:ext cx="1627266" cy="0"/>
+          </a:xfrm>
+          <a:prstGeom prst="line">
+            <a:avLst/>
+          </a:prstGeom>
+        </p:spPr>
+        <p:style>
+          <a:lnRef idx="3">
+            <a:schemeClr val="dk1"/>
+          </a:lnRef>
+          <a:fillRef idx="0">
+            <a:schemeClr val="dk1"/>
+          </a:fillRef>
+          <a:effectRef idx="2">
+            <a:schemeClr val="dk1"/>
+          </a:effectRef>
+          <a:fontRef idx="minor">
+            <a:schemeClr val="tx1"/>
+          </a:fontRef>
+        </p:style>
+      </p:cxnSp>
+      <p:cxnSp>
+        <p:nvCxnSpPr>
+          <p:cNvPr id="64" name="Connecteur droit 63">
+            <a:extLst>
+              <a:ext uri="{FF2B5EF4-FFF2-40B4-BE49-F238E27FC236}">
+                <a16:creationId xmlns:a16="http://schemas.microsoft.com/office/drawing/2014/main" id="{BC4D4E5F-5636-45CB-873C-EC085AB307A3}"/>
+              </a:ext>
+            </a:extLst>
+          </p:cNvPr>
+          <p:cNvCxnSpPr>
+            <a:cxnSpLocks/>
+          </p:cNvCxnSpPr>
+          <p:nvPr/>
+        </p:nvCxnSpPr>
+        <p:spPr>
+          <a:xfrm>
+            <a:off x="11715750" y="454801"/>
+            <a:ext cx="476249" cy="10400"/>
+          </a:xfrm>
+          <a:prstGeom prst="line">
+            <a:avLst/>
+          </a:prstGeom>
+        </p:spPr>
+        <p:style>
+          <a:lnRef idx="3">
+            <a:schemeClr val="dk1"/>
+          </a:lnRef>
+          <a:fillRef idx="0">
+            <a:schemeClr val="dk1"/>
+          </a:fillRef>
+          <a:effectRef idx="2">
+            <a:schemeClr val="dk1"/>
+          </a:effectRef>
+          <a:fontRef idx="minor">
+            <a:schemeClr val="tx1"/>
+          </a:fontRef>
+        </p:style>
+      </p:cxnSp>
+      <p:cxnSp>
+        <p:nvCxnSpPr>
+          <p:cNvPr id="65" name="Connecteur droit 64">
+            <a:extLst>
+              <a:ext uri="{FF2B5EF4-FFF2-40B4-BE49-F238E27FC236}">
+                <a16:creationId xmlns:a16="http://schemas.microsoft.com/office/drawing/2014/main" id="{E6F6B4C5-0E3B-46C9-859D-EE774175D36F}"/>
+              </a:ext>
+            </a:extLst>
+          </p:cNvPr>
+          <p:cNvCxnSpPr>
+            <a:cxnSpLocks/>
+          </p:cNvCxnSpPr>
+          <p:nvPr/>
+        </p:nvCxnSpPr>
+        <p:spPr>
+          <a:xfrm flipH="1">
+            <a:off x="2216372" y="446356"/>
+            <a:ext cx="364332" cy="501657"/>
+          </a:xfrm>
+          <a:prstGeom prst="line">
+            <a:avLst/>
+          </a:prstGeom>
+        </p:spPr>
+        <p:style>
+          <a:lnRef idx="3">
+            <a:schemeClr val="dk1"/>
+          </a:lnRef>
+          <a:fillRef idx="0">
+            <a:schemeClr val="dk1"/>
+          </a:fillRef>
+          <a:effectRef idx="2">
+            <a:schemeClr val="dk1"/>
+          </a:effectRef>
+          <a:fontRef idx="minor">
+            <a:schemeClr val="tx1"/>
+          </a:fontRef>
+        </p:style>
+      </p:cxnSp>
+      <p:sp>
+        <p:nvSpPr>
+          <p:cNvPr id="2" name="ZoneTexte 1">
+            <a:extLst>
+              <a:ext uri="{FF2B5EF4-FFF2-40B4-BE49-F238E27FC236}">
+                <a16:creationId xmlns:a16="http://schemas.microsoft.com/office/drawing/2014/main" id="{E8762E70-88D2-4566-9A54-94377E9A9CC8}"/>
+              </a:ext>
+            </a:extLst>
+          </p:cNvPr>
+          <p:cNvSpPr txBox="1"/>
+          <p:nvPr/>
+        </p:nvSpPr>
+        <p:spPr>
+          <a:xfrm>
+            <a:off x="3616922" y="473590"/>
+            <a:ext cx="4958155" cy="769441"/>
+          </a:xfrm>
+          <a:prstGeom prst="rect">
+            <a:avLst/>
+          </a:prstGeom>
+          <a:noFill/>
+        </p:spPr>
+        <p:txBody>
+          <a:bodyPr wrap="square" rtlCol="0">
+            <a:spAutoFit/>
+          </a:bodyPr>
+          <a:lstStyle/>
+          <a:p>
+            <a:r>
+              <a:rPr lang="fr-FR" sz="4400" dirty="0">
+                <a:latin typeface="Berlin Sans FB" panose="020E0602020502020306" pitchFamily="34" charset="0"/>
+              </a:rPr>
+              <a:t>Application Android</a:t>
+            </a:r>
+          </a:p>
+        </p:txBody>
+      </p:sp>
+      <p:sp>
+        <p:nvSpPr>
+          <p:cNvPr id="24" name="ZoneTexte 23">
+            <a:extLst>
+              <a:ext uri="{FF2B5EF4-FFF2-40B4-BE49-F238E27FC236}">
+                <a16:creationId xmlns:a16="http://schemas.microsoft.com/office/drawing/2014/main" id="{42387210-6B43-406B-9FDD-99ED00EF492F}"/>
+              </a:ext>
+            </a:extLst>
+          </p:cNvPr>
+          <p:cNvSpPr txBox="1"/>
+          <p:nvPr/>
+        </p:nvSpPr>
+        <p:spPr>
+          <a:xfrm>
+            <a:off x="11652188" y="6403199"/>
+            <a:ext cx="301686" cy="369332"/>
+          </a:xfrm>
+          <a:prstGeom prst="rect">
+            <a:avLst/>
+          </a:prstGeom>
+          <a:noFill/>
+        </p:spPr>
+        <p:txBody>
+          <a:bodyPr wrap="none" rtlCol="0">
+            <a:spAutoFit/>
+          </a:bodyPr>
+          <a:lstStyle/>
+          <a:p>
+            <a:r>
+              <a:rPr lang="fr-FR" dirty="0"/>
+              <a:t>6</a:t>
+            </a:r>
+          </a:p>
+        </p:txBody>
+      </p:sp>
+      <p:pic>
+        <p:nvPicPr>
+          <p:cNvPr id="27" name="Image 26">
+            <a:extLst>
+              <a:ext uri="{FF2B5EF4-FFF2-40B4-BE49-F238E27FC236}">
+                <a16:creationId xmlns:a16="http://schemas.microsoft.com/office/drawing/2014/main" id="{4F641507-6ECD-4BC9-898D-2632D9966EE4}"/>
+              </a:ext>
+            </a:extLst>
+          </p:cNvPr>
+          <p:cNvPicPr/>
+          <p:nvPr/>
+        </p:nvPicPr>
+        <p:blipFill>
+          <a:blip r:embed="rId4" cstate="print">
+            <a:extLst>
+              <a:ext uri="{28A0092B-C50C-407E-A947-70E740481C1C}">
+                <a14:useLocalDpi xmlns:a14="http://schemas.microsoft.com/office/drawing/2010/main" val="0"/>
+              </a:ext>
+            </a:extLst>
+          </a:blip>
+          <a:srcRect/>
+          <a:stretch>
+            <a:fillRect/>
+          </a:stretch>
+        </p:blipFill>
+        <p:spPr bwMode="auto">
+          <a:xfrm>
+            <a:off x="1272988" y="1243031"/>
+            <a:ext cx="2434088" cy="4921176"/>
+          </a:xfrm>
+          <a:prstGeom prst="rect">
+            <a:avLst/>
+          </a:prstGeom>
+          <a:noFill/>
+          <a:ln>
+            <a:noFill/>
+          </a:ln>
+        </p:spPr>
+      </p:pic>
+      <p:pic>
+        <p:nvPicPr>
+          <p:cNvPr id="28" name="Image 27">
+            <a:extLst>
+              <a:ext uri="{FF2B5EF4-FFF2-40B4-BE49-F238E27FC236}">
+                <a16:creationId xmlns:a16="http://schemas.microsoft.com/office/drawing/2014/main" id="{1E9E8233-6096-49CC-A245-9ACB9C9706A6}"/>
+              </a:ext>
+            </a:extLst>
+          </p:cNvPr>
+          <p:cNvPicPr/>
+          <p:nvPr/>
+        </p:nvPicPr>
+        <p:blipFill>
+          <a:blip r:embed="rId5" cstate="print">
+            <a:extLst>
+              <a:ext uri="{28A0092B-C50C-407E-A947-70E740481C1C}">
+                <a14:useLocalDpi xmlns:a14="http://schemas.microsoft.com/office/drawing/2010/main" val="0"/>
+              </a:ext>
+            </a:extLst>
+          </a:blip>
+          <a:srcRect/>
+          <a:stretch>
+            <a:fillRect/>
+          </a:stretch>
+        </p:blipFill>
+        <p:spPr bwMode="auto">
+          <a:xfrm>
+            <a:off x="4659782" y="1272216"/>
+            <a:ext cx="2434088" cy="4862806"/>
+          </a:xfrm>
+          <a:prstGeom prst="rect">
+            <a:avLst/>
+          </a:prstGeom>
+          <a:noFill/>
+          <a:ln>
+            <a:noFill/>
+          </a:ln>
+        </p:spPr>
+      </p:pic>
+      <p:pic>
+        <p:nvPicPr>
+          <p:cNvPr id="29" name="Image 28">
+            <a:extLst>
+              <a:ext uri="{FF2B5EF4-FFF2-40B4-BE49-F238E27FC236}">
+                <a16:creationId xmlns:a16="http://schemas.microsoft.com/office/drawing/2014/main" id="{3D91FE03-CCEC-443C-BB2B-29EB6EA6A25B}"/>
+              </a:ext>
+            </a:extLst>
+          </p:cNvPr>
+          <p:cNvPicPr/>
+          <p:nvPr/>
+        </p:nvPicPr>
+        <p:blipFill>
+          <a:blip r:embed="rId6" cstate="print">
+            <a:extLst>
+              <a:ext uri="{28A0092B-C50C-407E-A947-70E740481C1C}">
+                <a14:useLocalDpi xmlns:a14="http://schemas.microsoft.com/office/drawing/2010/main" val="0"/>
+              </a:ext>
+            </a:extLst>
+          </a:blip>
+          <a:srcRect/>
+          <a:stretch>
+            <a:fillRect/>
+          </a:stretch>
+        </p:blipFill>
+        <p:spPr bwMode="auto">
+          <a:xfrm>
+            <a:off x="8001835" y="1251420"/>
+            <a:ext cx="2458754" cy="4912787"/>
+          </a:xfrm>
+          <a:prstGeom prst="rect">
+            <a:avLst/>
+          </a:prstGeom>
+          <a:noFill/>
+          <a:ln>
+            <a:noFill/>
+          </a:ln>
+        </p:spPr>
+      </p:pic>
+      <p:sp>
+        <p:nvSpPr>
+          <p:cNvPr id="4" name="ZoneTexte 3">
+            <a:extLst>
+              <a:ext uri="{FF2B5EF4-FFF2-40B4-BE49-F238E27FC236}">
+                <a16:creationId xmlns:a16="http://schemas.microsoft.com/office/drawing/2014/main" id="{16C6552D-A26B-469A-BD9F-99FDEFB337BB}"/>
+              </a:ext>
+            </a:extLst>
+          </p:cNvPr>
+          <p:cNvSpPr txBox="1"/>
+          <p:nvPr/>
+        </p:nvSpPr>
+        <p:spPr>
+          <a:xfrm>
+            <a:off x="1611592" y="6249311"/>
+            <a:ext cx="1573892" cy="338554"/>
+          </a:xfrm>
+          <a:prstGeom prst="rect">
+            <a:avLst/>
+          </a:prstGeom>
+          <a:noFill/>
+        </p:spPr>
+        <p:txBody>
+          <a:bodyPr wrap="none" rtlCol="0">
+            <a:spAutoFit/>
+          </a:bodyPr>
+          <a:lstStyle/>
+          <a:p>
+            <a:r>
+              <a:rPr lang="fr-FR" sz="1600" i="1" dirty="0">
+                <a:solidFill>
+                  <a:schemeClr val="tx1">
+                    <a:lumMod val="50000"/>
+                    <a:lumOff val="50000"/>
+                  </a:schemeClr>
+                </a:solidFill>
+              </a:rPr>
+              <a:t>Fenêtre d’accueil</a:t>
+            </a:r>
+          </a:p>
+        </p:txBody>
+      </p:sp>
+      <p:sp>
+        <p:nvSpPr>
+          <p:cNvPr id="33" name="ZoneTexte 32">
+            <a:extLst>
+              <a:ext uri="{FF2B5EF4-FFF2-40B4-BE49-F238E27FC236}">
+                <a16:creationId xmlns:a16="http://schemas.microsoft.com/office/drawing/2014/main" id="{000D749A-0FB5-4974-8FDB-706AF1CF7FB1}"/>
+              </a:ext>
+            </a:extLst>
+          </p:cNvPr>
+          <p:cNvSpPr txBox="1"/>
+          <p:nvPr/>
+        </p:nvSpPr>
+        <p:spPr>
+          <a:xfrm>
+            <a:off x="4838400" y="6249311"/>
+            <a:ext cx="2076851" cy="338554"/>
+          </a:xfrm>
+          <a:prstGeom prst="rect">
+            <a:avLst/>
+          </a:prstGeom>
+          <a:noFill/>
+        </p:spPr>
+        <p:txBody>
+          <a:bodyPr wrap="none" rtlCol="0">
+            <a:spAutoFit/>
+          </a:bodyPr>
+          <a:lstStyle/>
+          <a:p>
+            <a:r>
+              <a:rPr lang="fr-FR" sz="1600" i="1" dirty="0">
+                <a:solidFill>
+                  <a:schemeClr val="tx1">
+                    <a:lumMod val="50000"/>
+                    <a:lumOff val="50000"/>
+                  </a:schemeClr>
+                </a:solidFill>
+              </a:rPr>
+              <a:t>Fenêtre « Dashboard »</a:t>
+            </a:r>
+          </a:p>
+        </p:txBody>
+      </p:sp>
+      <p:sp>
+        <p:nvSpPr>
+          <p:cNvPr id="34" name="ZoneTexte 33">
+            <a:extLst>
+              <a:ext uri="{FF2B5EF4-FFF2-40B4-BE49-F238E27FC236}">
+                <a16:creationId xmlns:a16="http://schemas.microsoft.com/office/drawing/2014/main" id="{1E092E05-CBDD-4535-9542-33D34BB02601}"/>
+              </a:ext>
+            </a:extLst>
+          </p:cNvPr>
+          <p:cNvSpPr txBox="1"/>
+          <p:nvPr/>
+        </p:nvSpPr>
+        <p:spPr>
+          <a:xfrm>
+            <a:off x="7915082" y="6249311"/>
+            <a:ext cx="2632259" cy="338554"/>
+          </a:xfrm>
+          <a:prstGeom prst="rect">
+            <a:avLst/>
+          </a:prstGeom>
+          <a:noFill/>
+        </p:spPr>
+        <p:txBody>
+          <a:bodyPr wrap="none" rtlCol="0">
+            <a:spAutoFit/>
+          </a:bodyPr>
+          <a:lstStyle/>
+          <a:p>
+            <a:r>
+              <a:rPr lang="fr-FR" sz="1600" i="1" dirty="0">
+                <a:solidFill>
+                  <a:schemeClr val="tx1">
+                    <a:lumMod val="50000"/>
+                    <a:lumOff val="50000"/>
+                  </a:schemeClr>
+                </a:solidFill>
+              </a:rPr>
+              <a:t>Fenêtre « Liste des capteurs »</a:t>
+            </a:r>
+          </a:p>
+        </p:txBody>
+      </p:sp>
+    </p:spTree>
+    <p:extLst>
+      <p:ext uri="{BB962C8B-B14F-4D97-AF65-F5344CB8AC3E}">
+        <p14:creationId xmlns:p14="http://schemas.microsoft.com/office/powerpoint/2010/main" val="3113916252"/>
+      </p:ext>
+    </p:extLst>
+  </p:cSld>
+  <p:clrMapOvr>
+    <a:masterClrMapping/>
+  </p:clrMapOvr>
+  <mc:AlternateContent xmlns:mc="http://schemas.openxmlformats.org/markup-compatibility/2006" xmlns:p14="http://schemas.microsoft.com/office/powerpoint/2010/main">
+    <mc:Choice Requires="p14">
+      <p:transition spd="slow">
+        <p14:reveal/>
+      </p:transition>
+    </mc:Choice>
+    <mc:Fallback xmlns="">
+      <p:transition spd="slow">
+        <p:fade/>
+      </p:transition>
+    </mc:Fallback>
+  </mc:AlternateContent>
+</p:sld>
+</file>
+
+<file path=ppt/slides/slide9.xml><?xml version="1.0" encoding="utf-8"?>
+<p:sld xmlns:a="http://schemas.openxmlformats.org/drawingml/2006/main" xmlns:r="http://schemas.openxmlformats.org/officeDocument/2006/relationships" xmlns:p="http://schemas.openxmlformats.org/presentationml/2006/main">
+  <p:cSld>
+    <p:spTree>
+      <p:nvGrpSpPr>
+        <p:cNvPr id="1" name=""/>
+        <p:cNvGrpSpPr/>
+        <p:nvPr/>
+      </p:nvGrpSpPr>
+      <p:grpSpPr>
+        <a:xfrm>
+          <a:off x="0" y="0"/>
+          <a:ext cx="0" cy="0"/>
+          <a:chOff x="0" y="0"/>
+          <a:chExt cx="0" cy="0"/>
+        </a:xfrm>
+      </p:grpSpPr>
+      <p:pic>
+        <p:nvPicPr>
+          <p:cNvPr id="8" name="Image 7">
+            <a:extLst>
+              <a:ext uri="{FF2B5EF4-FFF2-40B4-BE49-F238E27FC236}">
+                <a16:creationId xmlns:a16="http://schemas.microsoft.com/office/drawing/2014/main" id="{2BB825C5-31DA-4A56-85EA-536DBF510A31}"/>
+              </a:ext>
+            </a:extLst>
+          </p:cNvPr>
+          <p:cNvPicPr>
+            <a:picLocks noChangeAspect="1"/>
+          </p:cNvPicPr>
+          <p:nvPr/>
+        </p:nvPicPr>
+        <p:blipFill>
+          <a:blip r:embed="rId2">
+            <a:extLst>
+              <a:ext uri="{28A0092B-C50C-407E-A947-70E740481C1C}">
+                <a14:useLocalDpi xmlns:a14="http://schemas.microsoft.com/office/drawing/2010/main" val="0"/>
+              </a:ext>
+            </a:extLst>
+          </a:blip>
+          <a:stretch>
+            <a:fillRect/>
+          </a:stretch>
+        </p:blipFill>
+        <p:spPr>
+          <a:xfrm>
+            <a:off x="1068751" y="66457"/>
+            <a:ext cx="1259497" cy="776690"/>
+          </a:xfrm>
+          <a:prstGeom prst="rect">
+            <a:avLst/>
+          </a:prstGeom>
+        </p:spPr>
+      </p:pic>
+      <p:pic>
+        <p:nvPicPr>
+          <p:cNvPr id="10" name="Image 9">
+            <a:extLst>
+              <a:ext uri="{FF2B5EF4-FFF2-40B4-BE49-F238E27FC236}">
+                <a16:creationId xmlns:a16="http://schemas.microsoft.com/office/drawing/2014/main" id="{8EE7436F-49F2-41E0-93E4-D247B4705294}"/>
+              </a:ext>
+            </a:extLst>
+          </p:cNvPr>
+          <p:cNvPicPr>
+            <a:picLocks noChangeAspect="1"/>
+          </p:cNvPicPr>
+          <p:nvPr/>
+        </p:nvPicPr>
+        <p:blipFill>
+          <a:blip r:embed="rId3">
+            <a:extLst>
+              <a:ext uri="{28A0092B-C50C-407E-A947-70E740481C1C}">
+                <a14:useLocalDpi xmlns:a14="http://schemas.microsoft.com/office/drawing/2010/main" val="0"/>
+              </a:ext>
+            </a:extLst>
+          </a:blip>
+          <a:stretch>
+            <a:fillRect/>
+          </a:stretch>
+        </p:blipFill>
+        <p:spPr>
+          <a:xfrm>
+            <a:off x="9681085" y="238153"/>
+            <a:ext cx="1802101" cy="569807"/>
+          </a:xfrm>
+          <a:prstGeom prst="rect">
+            <a:avLst/>
+          </a:prstGeom>
+        </p:spPr>
+      </p:pic>
+      <p:cxnSp>
+        <p:nvCxnSpPr>
+          <p:cNvPr id="16" name="Connecteur droit 15">
+            <a:extLst>
+              <a:ext uri="{FF2B5EF4-FFF2-40B4-BE49-F238E27FC236}">
+                <a16:creationId xmlns:a16="http://schemas.microsoft.com/office/drawing/2014/main" id="{7319284A-BD6F-4A96-8E2B-E0A4B52E53C6}"/>
+              </a:ext>
+            </a:extLst>
+          </p:cNvPr>
+          <p:cNvCxnSpPr>
+            <a:cxnSpLocks/>
+          </p:cNvCxnSpPr>
+          <p:nvPr/>
+        </p:nvCxnSpPr>
+        <p:spPr>
+          <a:xfrm flipV="1">
+            <a:off x="0" y="454803"/>
+            <a:ext cx="738231" cy="1798"/>
+          </a:xfrm>
+          <a:prstGeom prst="line">
+            <a:avLst/>
+          </a:prstGeom>
+        </p:spPr>
+        <p:style>
+          <a:lnRef idx="3">
+            <a:schemeClr val="dk1"/>
+          </a:lnRef>
+          <a:fillRef idx="0">
+            <a:schemeClr val="dk1"/>
+          </a:fillRef>
+          <a:effectRef idx="2">
+            <a:schemeClr val="dk1"/>
+          </a:effectRef>
+          <a:fontRef idx="minor">
+            <a:schemeClr val="tx1"/>
+          </a:fontRef>
+        </p:style>
+      </p:cxnSp>
+      <p:cxnSp>
+        <p:nvCxnSpPr>
+          <p:cNvPr id="20" name="Connecteur droit 19">
+            <a:extLst>
+              <a:ext uri="{FF2B5EF4-FFF2-40B4-BE49-F238E27FC236}">
+                <a16:creationId xmlns:a16="http://schemas.microsoft.com/office/drawing/2014/main" id="{08874CF7-F149-4C81-B61E-74E18342BA8A}"/>
+              </a:ext>
+            </a:extLst>
+          </p:cNvPr>
+          <p:cNvCxnSpPr>
+            <a:cxnSpLocks/>
+          </p:cNvCxnSpPr>
+          <p:nvPr/>
+        </p:nvCxnSpPr>
+        <p:spPr>
+          <a:xfrm>
+            <a:off x="2573222" y="454803"/>
+            <a:ext cx="6829482" cy="10398"/>
+          </a:xfrm>
+          <a:prstGeom prst="line">
+            <a:avLst/>
+          </a:prstGeom>
+        </p:spPr>
+        <p:style>
+          <a:lnRef idx="3">
+            <a:schemeClr val="dk1"/>
+          </a:lnRef>
+          <a:fillRef idx="0">
+            <a:schemeClr val="dk1"/>
+          </a:fillRef>
+          <a:effectRef idx="2">
+            <a:schemeClr val="dk1"/>
+          </a:effectRef>
+          <a:fontRef idx="minor">
+            <a:schemeClr val="tx1"/>
+          </a:fontRef>
+        </p:style>
+      </p:cxnSp>
+      <p:cxnSp>
+        <p:nvCxnSpPr>
+          <p:cNvPr id="26" name="Connecteur droit 25">
+            <a:extLst>
+              <a:ext uri="{FF2B5EF4-FFF2-40B4-BE49-F238E27FC236}">
+                <a16:creationId xmlns:a16="http://schemas.microsoft.com/office/drawing/2014/main" id="{BB3B35CC-057B-48C1-880F-3306A6559175}"/>
+              </a:ext>
+            </a:extLst>
+          </p:cNvPr>
+          <p:cNvCxnSpPr>
+            <a:cxnSpLocks/>
+          </p:cNvCxnSpPr>
+          <p:nvPr/>
+        </p:nvCxnSpPr>
+        <p:spPr>
+          <a:xfrm>
+            <a:off x="738231" y="454803"/>
+            <a:ext cx="344203" cy="484764"/>
+          </a:xfrm>
+          <a:prstGeom prst="line">
+            <a:avLst/>
+          </a:prstGeom>
+        </p:spPr>
+        <p:style>
+          <a:lnRef idx="3">
+            <a:schemeClr val="dk1"/>
+          </a:lnRef>
+          <a:fillRef idx="0">
+            <a:schemeClr val="dk1"/>
+          </a:fillRef>
+          <a:effectRef idx="2">
+            <a:schemeClr val="dk1"/>
+          </a:effectRef>
+          <a:fontRef idx="minor">
+            <a:schemeClr val="tx1"/>
+          </a:fontRef>
+        </p:style>
+      </p:cxnSp>
+      <p:cxnSp>
+        <p:nvCxnSpPr>
+          <p:cNvPr id="32" name="Connecteur droit 31">
+            <a:extLst>
+              <a:ext uri="{FF2B5EF4-FFF2-40B4-BE49-F238E27FC236}">
+                <a16:creationId xmlns:a16="http://schemas.microsoft.com/office/drawing/2014/main" id="{4AD96496-1EB6-4E48-9BB2-5C255495C686}"/>
+              </a:ext>
+            </a:extLst>
+          </p:cNvPr>
+          <p:cNvCxnSpPr>
+            <a:cxnSpLocks/>
+          </p:cNvCxnSpPr>
+          <p:nvPr/>
+        </p:nvCxnSpPr>
+        <p:spPr>
+          <a:xfrm>
+            <a:off x="1082434" y="938268"/>
+            <a:ext cx="1146585" cy="0"/>
+          </a:xfrm>
+          <a:prstGeom prst="line">
+            <a:avLst/>
+          </a:prstGeom>
+        </p:spPr>
+        <p:style>
+          <a:lnRef idx="3">
+            <a:schemeClr val="dk1"/>
+          </a:lnRef>
+          <a:fillRef idx="0">
+            <a:schemeClr val="dk1"/>
+          </a:fillRef>
+          <a:effectRef idx="2">
+            <a:schemeClr val="dk1"/>
+          </a:effectRef>
+          <a:fontRef idx="minor">
+            <a:schemeClr val="tx1"/>
+          </a:fontRef>
+        </p:style>
+      </p:cxnSp>
+      <p:cxnSp>
+        <p:nvCxnSpPr>
+          <p:cNvPr id="51" name="Connecteur droit 50">
+            <a:extLst>
+              <a:ext uri="{FF2B5EF4-FFF2-40B4-BE49-F238E27FC236}">
+                <a16:creationId xmlns:a16="http://schemas.microsoft.com/office/drawing/2014/main" id="{C035BFA6-ECBF-4775-BA81-19D2CA41AA8D}"/>
+              </a:ext>
+            </a:extLst>
+          </p:cNvPr>
+          <p:cNvCxnSpPr>
+            <a:cxnSpLocks/>
+          </p:cNvCxnSpPr>
+          <p:nvPr/>
+        </p:nvCxnSpPr>
+        <p:spPr>
+          <a:xfrm>
+            <a:off x="9402704" y="465201"/>
+            <a:ext cx="344203" cy="495163"/>
+          </a:xfrm>
+          <a:prstGeom prst="line">
+            <a:avLst/>
+          </a:prstGeom>
+        </p:spPr>
+        <p:style>
+          <a:lnRef idx="3">
+            <a:schemeClr val="dk1"/>
+          </a:lnRef>
+          <a:fillRef idx="0">
+            <a:schemeClr val="dk1"/>
+          </a:fillRef>
+          <a:effectRef idx="2">
+            <a:schemeClr val="dk1"/>
+          </a:effectRef>
+          <a:fontRef idx="minor">
+            <a:schemeClr val="tx1"/>
+          </a:fontRef>
+        </p:style>
+      </p:cxnSp>
+      <p:cxnSp>
+        <p:nvCxnSpPr>
+          <p:cNvPr id="52" name="Connecteur droit 51">
+            <a:extLst>
+              <a:ext uri="{FF2B5EF4-FFF2-40B4-BE49-F238E27FC236}">
+                <a16:creationId xmlns:a16="http://schemas.microsoft.com/office/drawing/2014/main" id="{FA310BC7-694B-4984-99A2-61A1F4F6EBF9}"/>
+              </a:ext>
+            </a:extLst>
+          </p:cNvPr>
+          <p:cNvCxnSpPr>
+            <a:cxnSpLocks/>
+          </p:cNvCxnSpPr>
+          <p:nvPr/>
+        </p:nvCxnSpPr>
+        <p:spPr>
+          <a:xfrm flipH="1">
+            <a:off x="11370469" y="448308"/>
+            <a:ext cx="364332" cy="501657"/>
+          </a:xfrm>
+          <a:prstGeom prst="line">
+            <a:avLst/>
+          </a:prstGeom>
+        </p:spPr>
+        <p:style>
+          <a:lnRef idx="3">
+            <a:schemeClr val="dk1"/>
+          </a:lnRef>
+          <a:fillRef idx="0">
+            <a:schemeClr val="dk1"/>
+          </a:fillRef>
+          <a:effectRef idx="2">
+            <a:schemeClr val="dk1"/>
+          </a:effectRef>
+          <a:fontRef idx="minor">
+            <a:schemeClr val="tx1"/>
+          </a:fontRef>
+        </p:style>
+      </p:cxnSp>
+      <p:cxnSp>
+        <p:nvCxnSpPr>
+          <p:cNvPr id="53" name="Connecteur droit 52">
+            <a:extLst>
+              <a:ext uri="{FF2B5EF4-FFF2-40B4-BE49-F238E27FC236}">
+                <a16:creationId xmlns:a16="http://schemas.microsoft.com/office/drawing/2014/main" id="{BE0649BD-EE59-4DDA-960F-95B2572F9F13}"/>
+              </a:ext>
+            </a:extLst>
+          </p:cNvPr>
+          <p:cNvCxnSpPr>
+            <a:cxnSpLocks/>
+          </p:cNvCxnSpPr>
+          <p:nvPr/>
+        </p:nvCxnSpPr>
+        <p:spPr>
+          <a:xfrm>
+            <a:off x="9743203" y="949965"/>
+            <a:ext cx="1627266" cy="0"/>
+          </a:xfrm>
+          <a:prstGeom prst="line">
+            <a:avLst/>
+          </a:prstGeom>
+        </p:spPr>
+        <p:style>
+          <a:lnRef idx="3">
+            <a:schemeClr val="dk1"/>
+          </a:lnRef>
+          <a:fillRef idx="0">
+            <a:schemeClr val="dk1"/>
+          </a:fillRef>
+          <a:effectRef idx="2">
+            <a:schemeClr val="dk1"/>
+          </a:effectRef>
+          <a:fontRef idx="minor">
+            <a:schemeClr val="tx1"/>
+          </a:fontRef>
+        </p:style>
+      </p:cxnSp>
+      <p:cxnSp>
+        <p:nvCxnSpPr>
+          <p:cNvPr id="55" name="Connecteur droit 54">
+            <a:extLst>
+              <a:ext uri="{FF2B5EF4-FFF2-40B4-BE49-F238E27FC236}">
+                <a16:creationId xmlns:a16="http://schemas.microsoft.com/office/drawing/2014/main" id="{52AA9200-DAFA-4EEF-AC13-4C7CE82A59EC}"/>
+              </a:ext>
+            </a:extLst>
+          </p:cNvPr>
+          <p:cNvCxnSpPr>
+            <a:cxnSpLocks/>
+          </p:cNvCxnSpPr>
+          <p:nvPr/>
+        </p:nvCxnSpPr>
+        <p:spPr>
+          <a:xfrm>
+            <a:off x="11715750" y="454801"/>
+            <a:ext cx="476249" cy="10400"/>
+          </a:xfrm>
+          <a:prstGeom prst="line">
+            <a:avLst/>
+          </a:prstGeom>
+        </p:spPr>
+        <p:style>
+          <a:lnRef idx="3">
+            <a:schemeClr val="dk1"/>
+          </a:lnRef>
+          <a:fillRef idx="0">
+            <a:schemeClr val="dk1"/>
+          </a:fillRef>
+          <a:effectRef idx="2">
+            <a:schemeClr val="dk1"/>
+          </a:effectRef>
+          <a:fontRef idx="minor">
+            <a:schemeClr val="tx1"/>
+          </a:fontRef>
+        </p:style>
+      </p:cxnSp>
+      <p:cxnSp>
+        <p:nvCxnSpPr>
+          <p:cNvPr id="23" name="Connecteur droit 22">
+            <a:extLst>
+              <a:ext uri="{FF2B5EF4-FFF2-40B4-BE49-F238E27FC236}">
+                <a16:creationId xmlns:a16="http://schemas.microsoft.com/office/drawing/2014/main" id="{BCB092C8-0080-4E56-957E-0046D4C83988}"/>
+              </a:ext>
+            </a:extLst>
+          </p:cNvPr>
+          <p:cNvCxnSpPr>
+            <a:cxnSpLocks/>
+          </p:cNvCxnSpPr>
+          <p:nvPr/>
+        </p:nvCxnSpPr>
+        <p:spPr>
+          <a:xfrm flipH="1">
+            <a:off x="2216372" y="446356"/>
+            <a:ext cx="364332" cy="501657"/>
+          </a:xfrm>
+          <a:prstGeom prst="line">
+            <a:avLst/>
+          </a:prstGeom>
+        </p:spPr>
+        <p:style>
+          <a:lnRef idx="3">
+            <a:schemeClr val="dk1"/>
+          </a:lnRef>
+          <a:fillRef idx="0">
+            <a:schemeClr val="dk1"/>
+          </a:fillRef>
+          <a:effectRef idx="2">
+            <a:schemeClr val="dk1"/>
+          </a:effectRef>
+          <a:fontRef idx="minor">
+            <a:schemeClr val="tx1"/>
+          </a:fontRef>
+        </p:style>
+      </p:cxnSp>
+      <p:pic>
+        <p:nvPicPr>
+          <p:cNvPr id="57" name="Image 56">
+            <a:extLst>
+              <a:ext uri="{FF2B5EF4-FFF2-40B4-BE49-F238E27FC236}">
+                <a16:creationId xmlns:a16="http://schemas.microsoft.com/office/drawing/2014/main" id="{12B16FB2-5844-4B92-AE69-9BAC858C22BB}"/>
+              </a:ext>
+            </a:extLst>
+          </p:cNvPr>
+          <p:cNvPicPr>
+            <a:picLocks noChangeAspect="1"/>
+          </p:cNvPicPr>
+          <p:nvPr/>
+        </p:nvPicPr>
+        <p:blipFill>
+          <a:blip r:embed="rId3">
+            <a:extLst>
+              <a:ext uri="{28A0092B-C50C-407E-A947-70E740481C1C}">
+                <a14:useLocalDpi xmlns:a14="http://schemas.microsoft.com/office/drawing/2010/main" val="0"/>
+              </a:ext>
+            </a:extLst>
+          </a:blip>
+          <a:stretch>
+            <a:fillRect/>
+          </a:stretch>
+        </p:blipFill>
+        <p:spPr>
+          <a:xfrm>
+            <a:off x="9681085" y="238153"/>
+            <a:ext cx="1802101" cy="569807"/>
+          </a:xfrm>
+          <a:prstGeom prst="rect">
+            <a:avLst/>
+          </a:prstGeom>
+        </p:spPr>
+      </p:pic>
+      <p:cxnSp>
+        <p:nvCxnSpPr>
+          <p:cNvPr id="58" name="Connecteur droit 57">
+            <a:extLst>
+              <a:ext uri="{FF2B5EF4-FFF2-40B4-BE49-F238E27FC236}">
+                <a16:creationId xmlns:a16="http://schemas.microsoft.com/office/drawing/2014/main" id="{01599350-F8B0-4FDC-B003-981189A8D654}"/>
+              </a:ext>
+            </a:extLst>
+          </p:cNvPr>
+          <p:cNvCxnSpPr>
+            <a:cxnSpLocks/>
+          </p:cNvCxnSpPr>
+          <p:nvPr/>
+        </p:nvCxnSpPr>
+        <p:spPr>
+          <a:xfrm>
+            <a:off x="2573222" y="454803"/>
+            <a:ext cx="6829482" cy="10398"/>
+          </a:xfrm>
+          <a:prstGeom prst="line">
+            <a:avLst/>
+          </a:prstGeom>
+        </p:spPr>
+        <p:style>
+          <a:lnRef idx="3">
+            <a:schemeClr val="dk1"/>
+          </a:lnRef>
+          <a:fillRef idx="0">
+            <a:schemeClr val="dk1"/>
+          </a:fillRef>
+          <a:effectRef idx="2">
+            <a:schemeClr val="dk1"/>
+          </a:effectRef>
+          <a:fontRef idx="minor">
+            <a:schemeClr val="tx1"/>
+          </a:fontRef>
+        </p:style>
+      </p:cxnSp>
+      <p:cxnSp>
+        <p:nvCxnSpPr>
+          <p:cNvPr id="59" name="Connecteur droit 58">
+            <a:extLst>
+              <a:ext uri="{FF2B5EF4-FFF2-40B4-BE49-F238E27FC236}">
+                <a16:creationId xmlns:a16="http://schemas.microsoft.com/office/drawing/2014/main" id="{BC6E6150-6054-4785-84EC-0C46D82034C2}"/>
+              </a:ext>
+            </a:extLst>
+          </p:cNvPr>
+          <p:cNvCxnSpPr>
+            <a:cxnSpLocks/>
+          </p:cNvCxnSpPr>
+          <p:nvPr/>
+        </p:nvCxnSpPr>
+        <p:spPr>
+          <a:xfrm>
+            <a:off x="738231" y="454803"/>
+            <a:ext cx="344203" cy="484764"/>
+          </a:xfrm>
+          <a:prstGeom prst="line">
+            <a:avLst/>
+          </a:prstGeom>
+        </p:spPr>
+        <p:style>
+          <a:lnRef idx="3">
+            <a:schemeClr val="dk1"/>
+          </a:lnRef>
+          <a:fillRef idx="0">
+            <a:schemeClr val="dk1"/>
+          </a:fillRef>
+          <a:effectRef idx="2">
+            <a:schemeClr val="dk1"/>
+          </a:effectRef>
+          <a:fontRef idx="minor">
+            <a:schemeClr val="tx1"/>
+          </a:fontRef>
+        </p:style>
+      </p:cxnSp>
+      <p:cxnSp>
+        <p:nvCxnSpPr>
+          <p:cNvPr id="60" name="Connecteur droit 59">
+            <a:extLst>
+              <a:ext uri="{FF2B5EF4-FFF2-40B4-BE49-F238E27FC236}">
+                <a16:creationId xmlns:a16="http://schemas.microsoft.com/office/drawing/2014/main" id="{CBC9961A-8EC2-4287-A398-BCA4138D409D}"/>
+              </a:ext>
+            </a:extLst>
+          </p:cNvPr>
+          <p:cNvCxnSpPr>
+            <a:cxnSpLocks/>
+          </p:cNvCxnSpPr>
+          <p:nvPr/>
+        </p:nvCxnSpPr>
+        <p:spPr>
+          <a:xfrm>
+            <a:off x="1082434" y="938268"/>
+            <a:ext cx="1146585" cy="0"/>
+          </a:xfrm>
+          <a:prstGeom prst="line">
+            <a:avLst/>
+          </a:prstGeom>
+        </p:spPr>
+        <p:style>
+          <a:lnRef idx="3">
+            <a:schemeClr val="dk1"/>
+          </a:lnRef>
+          <a:fillRef idx="0">
+            <a:schemeClr val="dk1"/>
+          </a:fillRef>
+          <a:effectRef idx="2">
+            <a:schemeClr val="dk1"/>
+          </a:effectRef>
+          <a:fontRef idx="minor">
+            <a:schemeClr val="tx1"/>
+          </a:fontRef>
+        </p:style>
+      </p:cxnSp>
+      <p:cxnSp>
+        <p:nvCxnSpPr>
+          <p:cNvPr id="61" name="Connecteur droit 60">
+            <a:extLst>
+              <a:ext uri="{FF2B5EF4-FFF2-40B4-BE49-F238E27FC236}">
+                <a16:creationId xmlns:a16="http://schemas.microsoft.com/office/drawing/2014/main" id="{152B7C45-2543-4665-BC07-4DB71CA9F337}"/>
+              </a:ext>
+            </a:extLst>
+          </p:cNvPr>
+          <p:cNvCxnSpPr>
+            <a:cxnSpLocks/>
+          </p:cNvCxnSpPr>
+          <p:nvPr/>
+        </p:nvCxnSpPr>
+        <p:spPr>
+          <a:xfrm>
+            <a:off x="9402704" y="465201"/>
+            <a:ext cx="344203" cy="495163"/>
+          </a:xfrm>
+          <a:prstGeom prst="line">
+            <a:avLst/>
+          </a:prstGeom>
+        </p:spPr>
+        <p:style>
+          <a:lnRef idx="3">
+            <a:schemeClr val="dk1"/>
+          </a:lnRef>
+          <a:fillRef idx="0">
+            <a:schemeClr val="dk1"/>
+          </a:fillRef>
+          <a:effectRef idx="2">
+            <a:schemeClr val="dk1"/>
+          </a:effectRef>
+          <a:fontRef idx="minor">
+            <a:schemeClr val="tx1"/>
+          </a:fontRef>
+        </p:style>
+      </p:cxnSp>
+      <p:cxnSp>
+        <p:nvCxnSpPr>
+          <p:cNvPr id="62" name="Connecteur droit 61">
+            <a:extLst>
+              <a:ext uri="{FF2B5EF4-FFF2-40B4-BE49-F238E27FC236}">
+                <a16:creationId xmlns:a16="http://schemas.microsoft.com/office/drawing/2014/main" id="{00A84DC3-A112-46A3-B71C-04D85339323D}"/>
+              </a:ext>
+            </a:extLst>
+          </p:cNvPr>
+          <p:cNvCxnSpPr>
+            <a:cxnSpLocks/>
+          </p:cNvCxnSpPr>
+          <p:nvPr/>
+        </p:nvCxnSpPr>
+        <p:spPr>
+          <a:xfrm flipH="1">
+            <a:off x="11370469" y="448308"/>
+            <a:ext cx="364332" cy="501657"/>
+          </a:xfrm>
+          <a:prstGeom prst="line">
+            <a:avLst/>
+          </a:prstGeom>
+        </p:spPr>
+        <p:style>
+          <a:lnRef idx="3">
+            <a:schemeClr val="dk1"/>
+          </a:lnRef>
+          <a:fillRef idx="0">
+            <a:schemeClr val="dk1"/>
+          </a:fillRef>
+          <a:effectRef idx="2">
+            <a:schemeClr val="dk1"/>
+          </a:effectRef>
+          <a:fontRef idx="minor">
+            <a:schemeClr val="tx1"/>
+          </a:fontRef>
+        </p:style>
+      </p:cxnSp>
+      <p:cxnSp>
+        <p:nvCxnSpPr>
+          <p:cNvPr id="63" name="Connecteur droit 62">
+            <a:extLst>
+              <a:ext uri="{FF2B5EF4-FFF2-40B4-BE49-F238E27FC236}">
+                <a16:creationId xmlns:a16="http://schemas.microsoft.com/office/drawing/2014/main" id="{C50788C6-8F68-44EC-AB54-94C1D2FE554D}"/>
+              </a:ext>
+            </a:extLst>
+          </p:cNvPr>
+          <p:cNvCxnSpPr>
+            <a:cxnSpLocks/>
+          </p:cNvCxnSpPr>
+          <p:nvPr/>
+        </p:nvCxnSpPr>
+        <p:spPr>
+          <a:xfrm>
+            <a:off x="9743203" y="949965"/>
+            <a:ext cx="1627266" cy="0"/>
+          </a:xfrm>
+          <a:prstGeom prst="line">
+            <a:avLst/>
+          </a:prstGeom>
+        </p:spPr>
+        <p:style>
+          <a:lnRef idx="3">
+            <a:schemeClr val="dk1"/>
+          </a:lnRef>
+          <a:fillRef idx="0">
+            <a:schemeClr val="dk1"/>
+          </a:fillRef>
+          <a:effectRef idx="2">
+            <a:schemeClr val="dk1"/>
+          </a:effectRef>
+          <a:fontRef idx="minor">
+            <a:schemeClr val="tx1"/>
+          </a:fontRef>
+        </p:style>
+      </p:cxnSp>
+      <p:cxnSp>
+        <p:nvCxnSpPr>
+          <p:cNvPr id="64" name="Connecteur droit 63">
+            <a:extLst>
+              <a:ext uri="{FF2B5EF4-FFF2-40B4-BE49-F238E27FC236}">
+                <a16:creationId xmlns:a16="http://schemas.microsoft.com/office/drawing/2014/main" id="{BC4D4E5F-5636-45CB-873C-EC085AB307A3}"/>
+              </a:ext>
+            </a:extLst>
+          </p:cNvPr>
+          <p:cNvCxnSpPr>
+            <a:cxnSpLocks/>
+          </p:cNvCxnSpPr>
+          <p:nvPr/>
+        </p:nvCxnSpPr>
+        <p:spPr>
+          <a:xfrm>
+            <a:off x="11715750" y="454801"/>
+            <a:ext cx="476249" cy="10400"/>
+          </a:xfrm>
+          <a:prstGeom prst="line">
+            <a:avLst/>
+          </a:prstGeom>
+        </p:spPr>
+        <p:style>
+          <a:lnRef idx="3">
+            <a:schemeClr val="dk1"/>
+          </a:lnRef>
+          <a:fillRef idx="0">
+            <a:schemeClr val="dk1"/>
+          </a:fillRef>
+          <a:effectRef idx="2">
+            <a:schemeClr val="dk1"/>
+          </a:effectRef>
+          <a:fontRef idx="minor">
+            <a:schemeClr val="tx1"/>
+          </a:fontRef>
+        </p:style>
+      </p:cxnSp>
+      <p:cxnSp>
+        <p:nvCxnSpPr>
+          <p:cNvPr id="65" name="Connecteur droit 64">
+            <a:extLst>
+              <a:ext uri="{FF2B5EF4-FFF2-40B4-BE49-F238E27FC236}">
+                <a16:creationId xmlns:a16="http://schemas.microsoft.com/office/drawing/2014/main" id="{E6F6B4C5-0E3B-46C9-859D-EE774175D36F}"/>
+              </a:ext>
+            </a:extLst>
+          </p:cNvPr>
+          <p:cNvCxnSpPr>
+            <a:cxnSpLocks/>
+          </p:cNvCxnSpPr>
+          <p:nvPr/>
+        </p:nvCxnSpPr>
+        <p:spPr>
+          <a:xfrm flipH="1">
+            <a:off x="2216372" y="446356"/>
+            <a:ext cx="364332" cy="501657"/>
+          </a:xfrm>
+          <a:prstGeom prst="line">
+            <a:avLst/>
+          </a:prstGeom>
+        </p:spPr>
+        <p:style>
+          <a:lnRef idx="3">
+            <a:schemeClr val="dk1"/>
+          </a:lnRef>
+          <a:fillRef idx="0">
+            <a:schemeClr val="dk1"/>
+          </a:fillRef>
+          <a:effectRef idx="2">
+            <a:schemeClr val="dk1"/>
+          </a:effectRef>
+          <a:fontRef idx="minor">
+            <a:schemeClr val="tx1"/>
+          </a:fontRef>
+        </p:style>
+      </p:cxnSp>
+      <p:sp>
+        <p:nvSpPr>
+          <p:cNvPr id="2" name="ZoneTexte 1">
+            <a:extLst>
+              <a:ext uri="{FF2B5EF4-FFF2-40B4-BE49-F238E27FC236}">
+                <a16:creationId xmlns:a16="http://schemas.microsoft.com/office/drawing/2014/main" id="{E8762E70-88D2-4566-9A54-94377E9A9CC8}"/>
+              </a:ext>
+            </a:extLst>
+          </p:cNvPr>
+          <p:cNvSpPr txBox="1"/>
+          <p:nvPr/>
+        </p:nvSpPr>
+        <p:spPr>
+          <a:xfrm>
+            <a:off x="4298215" y="475204"/>
+            <a:ext cx="3379496" cy="769441"/>
+          </a:xfrm>
+          <a:prstGeom prst="rect">
+            <a:avLst/>
+          </a:prstGeom>
+          <a:noFill/>
+        </p:spPr>
+        <p:txBody>
+          <a:bodyPr wrap="square" rtlCol="0">
+            <a:spAutoFit/>
+          </a:bodyPr>
+          <a:lstStyle/>
+          <a:p>
+            <a:r>
+              <a:rPr lang="fr-FR" sz="4400" dirty="0">
+                <a:latin typeface="Berlin Sans FB" panose="020E0602020502020306" pitchFamily="34" charset="0"/>
+              </a:rPr>
+              <a:t>Tests unitaires</a:t>
+            </a:r>
+          </a:p>
+        </p:txBody>
+      </p:sp>
+      <p:sp>
+        <p:nvSpPr>
+          <p:cNvPr id="24" name="ZoneTexte 23">
+            <a:extLst>
+              <a:ext uri="{FF2B5EF4-FFF2-40B4-BE49-F238E27FC236}">
+                <a16:creationId xmlns:a16="http://schemas.microsoft.com/office/drawing/2014/main" id="{42387210-6B43-406B-9FDD-99ED00EF492F}"/>
+              </a:ext>
+            </a:extLst>
+          </p:cNvPr>
+          <p:cNvSpPr txBox="1"/>
+          <p:nvPr/>
+        </p:nvSpPr>
+        <p:spPr>
+          <a:xfrm>
+            <a:off x="11652188" y="6403199"/>
+            <a:ext cx="301686" cy="369332"/>
+          </a:xfrm>
+          <a:prstGeom prst="rect">
+            <a:avLst/>
+          </a:prstGeom>
+          <a:noFill/>
+        </p:spPr>
+        <p:txBody>
+          <a:bodyPr wrap="none" rtlCol="0">
+            <a:spAutoFit/>
+          </a:bodyPr>
+          <a:lstStyle/>
+          <a:p>
+            <a:r>
+              <a:rPr lang="fr-FR" dirty="0"/>
+              <a:t>7</a:t>
+            </a:r>
+          </a:p>
+        </p:txBody>
+      </p:sp>
+      <p:grpSp>
+        <p:nvGrpSpPr>
+          <p:cNvPr id="6" name="Groupe 5">
+            <a:extLst>
+              <a:ext uri="{FF2B5EF4-FFF2-40B4-BE49-F238E27FC236}">
+                <a16:creationId xmlns:a16="http://schemas.microsoft.com/office/drawing/2014/main" id="{D17549C8-743D-4D76-ADF3-3E003BF6C678}"/>
+              </a:ext>
+            </a:extLst>
+          </p:cNvPr>
+          <p:cNvGrpSpPr/>
+          <p:nvPr/>
+        </p:nvGrpSpPr>
+        <p:grpSpPr>
+          <a:xfrm>
+            <a:off x="8718290" y="1244645"/>
+            <a:ext cx="2458754" cy="4912787"/>
+            <a:chOff x="4758586" y="1254648"/>
+            <a:chExt cx="2458754" cy="4912787"/>
+          </a:xfrm>
+        </p:grpSpPr>
+        <p:pic>
+          <p:nvPicPr>
+            <p:cNvPr id="30" name="Image 29">
+              <a:extLst>
+                <a:ext uri="{FF2B5EF4-FFF2-40B4-BE49-F238E27FC236}">
+                  <a16:creationId xmlns:a16="http://schemas.microsoft.com/office/drawing/2014/main" id="{589B0617-564C-4E15-AC1B-8AEDB696034A}"/>
+                </a:ext>
+              </a:extLst>
+            </p:cNvPr>
+            <p:cNvPicPr/>
+            <p:nvPr/>
+          </p:nvPicPr>
+          <p:blipFill>
+            <a:blip r:embed="rId4" cstate="print">
+              <a:extLst>
+                <a:ext uri="{28A0092B-C50C-407E-A947-70E740481C1C}">
+                  <a14:useLocalDpi xmlns:a14="http://schemas.microsoft.com/office/drawing/2010/main" val="0"/>
+                </a:ext>
+              </a:extLst>
+            </a:blip>
+            <a:srcRect/>
+            <a:stretch>
+              <a:fillRect/>
+            </a:stretch>
+          </p:blipFill>
+          <p:spPr bwMode="auto">
+            <a:xfrm>
+              <a:off x="4758586" y="1254648"/>
+              <a:ext cx="2458754" cy="4912787"/>
+            </a:xfrm>
+            <a:prstGeom prst="rect">
+              <a:avLst/>
+            </a:prstGeom>
+            <a:noFill/>
+            <a:ln>
+              <a:noFill/>
+            </a:ln>
+          </p:spPr>
+        </p:pic>
+        <p:sp>
+          <p:nvSpPr>
+            <p:cNvPr id="5" name="Rectangle : coins arrondis 4">
+              <a:extLst>
+                <a:ext uri="{FF2B5EF4-FFF2-40B4-BE49-F238E27FC236}">
+                  <a16:creationId xmlns:a16="http://schemas.microsoft.com/office/drawing/2014/main" id="{1DA3106E-73B5-40DE-A581-954CCA05A08C}"/>
+                </a:ext>
+              </a:extLst>
+            </p:cNvPr>
+            <p:cNvSpPr/>
+            <p:nvPr/>
+          </p:nvSpPr>
+          <p:spPr>
+            <a:xfrm>
+              <a:off x="4758586" y="2064190"/>
+              <a:ext cx="2458754" cy="425513"/>
+            </a:xfrm>
+            <a:prstGeom prst="roundRect">
+              <a:avLst/>
+            </a:prstGeom>
+            <a:noFill/>
+            <a:ln>
+              <a:solidFill>
+                <a:srgbClr val="FF0000"/>
+              </a:solidFill>
+            </a:ln>
+          </p:spPr>
+          <p:style>
+            <a:lnRef idx="2">
+              <a:schemeClr val="accent1">
+                <a:shade val="50000"/>
+              </a:schemeClr>
+            </a:lnRef>
+            <a:fillRef idx="1">
+              <a:schemeClr val="accent1"/>
+            </a:fillRef>
+            <a:effectRef idx="0">
+              <a:schemeClr val="accent1"/>
+            </a:effectRef>
+            <a:fontRef idx="minor">
+              <a:schemeClr val="lt1"/>
+            </a:fontRef>
+          </p:style>
+          <p:txBody>
+            <a:bodyPr rtlCol="0" anchor="ctr"/>
+            <a:lstStyle/>
+            <a:p>
+              <a:pPr algn="ctr"/>
+              <a:endParaRPr lang="fr-FR"/>
+            </a:p>
+          </p:txBody>
+        </p:sp>
+        <p:sp>
+          <p:nvSpPr>
+            <p:cNvPr id="35" name="Rectangle : coins arrondis 34">
+              <a:extLst>
+                <a:ext uri="{FF2B5EF4-FFF2-40B4-BE49-F238E27FC236}">
+                  <a16:creationId xmlns:a16="http://schemas.microsoft.com/office/drawing/2014/main" id="{886D5FD2-11B7-4BF5-B8A1-888099CE0792}"/>
+                </a:ext>
+              </a:extLst>
+            </p:cNvPr>
+            <p:cNvSpPr/>
+            <p:nvPr/>
+          </p:nvSpPr>
+          <p:spPr>
+            <a:xfrm>
+              <a:off x="4758586" y="2541222"/>
+              <a:ext cx="2458754" cy="425513"/>
+            </a:xfrm>
+            <a:prstGeom prst="roundRect">
+              <a:avLst/>
+            </a:prstGeom>
+            <a:noFill/>
+            <a:ln>
+              <a:solidFill>
+                <a:srgbClr val="FF0000"/>
+              </a:solidFill>
+            </a:ln>
+          </p:spPr>
+          <p:style>
+            <a:lnRef idx="2">
+              <a:schemeClr val="accent1">
+                <a:shade val="50000"/>
+              </a:schemeClr>
+            </a:lnRef>
+            <a:fillRef idx="1">
+              <a:schemeClr val="accent1"/>
+            </a:fillRef>
+            <a:effectRef idx="0">
+              <a:schemeClr val="accent1"/>
+            </a:effectRef>
+            <a:fontRef idx="minor">
+              <a:schemeClr val="lt1"/>
+            </a:fontRef>
+          </p:style>
+          <p:txBody>
+            <a:bodyPr rtlCol="0" anchor="ctr"/>
+            <a:lstStyle/>
+            <a:p>
+              <a:pPr algn="ctr"/>
+              <a:endParaRPr lang="fr-FR"/>
+            </a:p>
+          </p:txBody>
+        </p:sp>
+        <p:sp>
+          <p:nvSpPr>
+            <p:cNvPr id="36" name="Rectangle : coins arrondis 35">
+              <a:extLst>
+                <a:ext uri="{FF2B5EF4-FFF2-40B4-BE49-F238E27FC236}">
+                  <a16:creationId xmlns:a16="http://schemas.microsoft.com/office/drawing/2014/main" id="{2DAAA51D-B9AF-4337-B1FA-A226173FCE5D}"/>
+                </a:ext>
+              </a:extLst>
+            </p:cNvPr>
+            <p:cNvSpPr/>
+            <p:nvPr/>
+          </p:nvSpPr>
+          <p:spPr>
+            <a:xfrm>
+              <a:off x="4758586" y="3007960"/>
+              <a:ext cx="2458754" cy="425513"/>
+            </a:xfrm>
+            <a:prstGeom prst="roundRect">
+              <a:avLst/>
+            </a:prstGeom>
+            <a:noFill/>
+            <a:ln>
+              <a:solidFill>
+                <a:srgbClr val="FF0000"/>
+              </a:solidFill>
+            </a:ln>
+          </p:spPr>
+          <p:style>
+            <a:lnRef idx="2">
+              <a:schemeClr val="accent1">
+                <a:shade val="50000"/>
+              </a:schemeClr>
+            </a:lnRef>
+            <a:fillRef idx="1">
+              <a:schemeClr val="accent1"/>
+            </a:fillRef>
+            <a:effectRef idx="0">
+              <a:schemeClr val="accent1"/>
+            </a:effectRef>
+            <a:fontRef idx="minor">
+              <a:schemeClr val="lt1"/>
+            </a:fontRef>
+          </p:style>
+          <p:txBody>
+            <a:bodyPr rtlCol="0" anchor="ctr"/>
+            <a:lstStyle/>
+            <a:p>
+              <a:pPr algn="ctr"/>
+              <a:endParaRPr lang="fr-FR"/>
+            </a:p>
+          </p:txBody>
+        </p:sp>
+        <p:sp>
+          <p:nvSpPr>
+            <p:cNvPr id="37" name="Rectangle : coins arrondis 36">
+              <a:extLst>
+                <a:ext uri="{FF2B5EF4-FFF2-40B4-BE49-F238E27FC236}">
+                  <a16:creationId xmlns:a16="http://schemas.microsoft.com/office/drawing/2014/main" id="{BD4BB537-3A8F-403C-BE2E-D9C41FD634F1}"/>
+                </a:ext>
+              </a:extLst>
+            </p:cNvPr>
+            <p:cNvSpPr/>
+            <p:nvPr/>
+          </p:nvSpPr>
+          <p:spPr>
+            <a:xfrm>
+              <a:off x="4758586" y="3485421"/>
+              <a:ext cx="2458754" cy="425513"/>
+            </a:xfrm>
+            <a:prstGeom prst="roundRect">
+              <a:avLst/>
+            </a:prstGeom>
+            <a:noFill/>
+            <a:ln>
+              <a:solidFill>
+                <a:srgbClr val="FF0000"/>
+              </a:solidFill>
+            </a:ln>
+          </p:spPr>
+          <p:style>
+            <a:lnRef idx="2">
+              <a:schemeClr val="accent1">
+                <a:shade val="50000"/>
+              </a:schemeClr>
+            </a:lnRef>
+            <a:fillRef idx="1">
+              <a:schemeClr val="accent1"/>
+            </a:fillRef>
+            <a:effectRef idx="0">
+              <a:schemeClr val="accent1"/>
+            </a:effectRef>
+            <a:fontRef idx="minor">
+              <a:schemeClr val="lt1"/>
+            </a:fontRef>
+          </p:style>
+          <p:txBody>
+            <a:bodyPr rtlCol="0" anchor="ctr"/>
+            <a:lstStyle/>
+            <a:p>
+              <a:pPr algn="ctr"/>
+              <a:endParaRPr lang="fr-FR"/>
+            </a:p>
+          </p:txBody>
+        </p:sp>
+        <p:sp>
+          <p:nvSpPr>
+            <p:cNvPr id="38" name="Rectangle : coins arrondis 37">
+              <a:extLst>
+                <a:ext uri="{FF2B5EF4-FFF2-40B4-BE49-F238E27FC236}">
+                  <a16:creationId xmlns:a16="http://schemas.microsoft.com/office/drawing/2014/main" id="{3194E76B-D5F3-4D3E-AC5F-4806453DB3C1}"/>
+                </a:ext>
+              </a:extLst>
+            </p:cNvPr>
+            <p:cNvSpPr/>
+            <p:nvPr/>
+          </p:nvSpPr>
+          <p:spPr>
+            <a:xfrm>
+              <a:off x="4758586" y="3957010"/>
+              <a:ext cx="2458754" cy="425513"/>
+            </a:xfrm>
+            <a:prstGeom prst="roundRect">
+              <a:avLst/>
+            </a:prstGeom>
+            <a:noFill/>
+            <a:ln>
+              <a:solidFill>
+                <a:srgbClr val="FF0000"/>
+              </a:solidFill>
+            </a:ln>
+          </p:spPr>
+          <p:style>
+            <a:lnRef idx="2">
+              <a:schemeClr val="accent1">
+                <a:shade val="50000"/>
+              </a:schemeClr>
+            </a:lnRef>
+            <a:fillRef idx="1">
+              <a:schemeClr val="accent1"/>
+            </a:fillRef>
+            <a:effectRef idx="0">
+              <a:schemeClr val="accent1"/>
+            </a:effectRef>
+            <a:fontRef idx="minor">
+              <a:schemeClr val="lt1"/>
+            </a:fontRef>
+          </p:style>
+          <p:txBody>
+            <a:bodyPr rtlCol="0" anchor="ctr"/>
+            <a:lstStyle/>
+            <a:p>
+              <a:pPr algn="ctr"/>
+              <a:endParaRPr lang="fr-FR"/>
+            </a:p>
+          </p:txBody>
+        </p:sp>
+        <p:sp>
+          <p:nvSpPr>
+            <p:cNvPr id="39" name="Rectangle : coins arrondis 38">
+              <a:extLst>
+                <a:ext uri="{FF2B5EF4-FFF2-40B4-BE49-F238E27FC236}">
+                  <a16:creationId xmlns:a16="http://schemas.microsoft.com/office/drawing/2014/main" id="{D078E1D0-BC16-4E2E-A070-424988E6C8C3}"/>
+                </a:ext>
+              </a:extLst>
+            </p:cNvPr>
+            <p:cNvSpPr/>
+            <p:nvPr/>
+          </p:nvSpPr>
+          <p:spPr>
+            <a:xfrm>
+              <a:off x="4758586" y="4428210"/>
+              <a:ext cx="2458754" cy="425513"/>
+            </a:xfrm>
+            <a:prstGeom prst="roundRect">
+              <a:avLst/>
+            </a:prstGeom>
+            <a:noFill/>
+            <a:ln>
+              <a:solidFill>
+                <a:srgbClr val="FF0000"/>
+              </a:solidFill>
+            </a:ln>
+          </p:spPr>
+          <p:style>
+            <a:lnRef idx="2">
+              <a:schemeClr val="accent1">
+                <a:shade val="50000"/>
+              </a:schemeClr>
+            </a:lnRef>
+            <a:fillRef idx="1">
+              <a:schemeClr val="accent1"/>
+            </a:fillRef>
+            <a:effectRef idx="0">
+              <a:schemeClr val="accent1"/>
+            </a:effectRef>
+            <a:fontRef idx="minor">
+              <a:schemeClr val="lt1"/>
+            </a:fontRef>
+          </p:style>
+          <p:txBody>
+            <a:bodyPr rtlCol="0" anchor="ctr"/>
+            <a:lstStyle/>
+            <a:p>
+              <a:pPr algn="ctr"/>
+              <a:endParaRPr lang="fr-FR"/>
+            </a:p>
+          </p:txBody>
+        </p:sp>
+      </p:grpSp>
+      <p:sp>
+        <p:nvSpPr>
+          <p:cNvPr id="7" name="ZoneTexte 6">
+            <a:extLst>
+              <a:ext uri="{FF2B5EF4-FFF2-40B4-BE49-F238E27FC236}">
+                <a16:creationId xmlns:a16="http://schemas.microsoft.com/office/drawing/2014/main" id="{1A6E6665-F0CC-4FE7-A22A-6199E82E626D}"/>
+              </a:ext>
+            </a:extLst>
+          </p:cNvPr>
+          <p:cNvSpPr txBox="1"/>
+          <p:nvPr/>
+        </p:nvSpPr>
+        <p:spPr>
+          <a:xfrm>
+            <a:off x="738231" y="2295034"/>
+            <a:ext cx="6262548" cy="369332"/>
+          </a:xfrm>
+          <a:prstGeom prst="rect">
+            <a:avLst/>
+          </a:prstGeom>
+          <a:noFill/>
+        </p:spPr>
+        <p:txBody>
+          <a:bodyPr wrap="none" rtlCol="0">
+            <a:spAutoFit/>
+          </a:bodyPr>
+          <a:lstStyle/>
+          <a:p>
+            <a:r>
+              <a:rPr lang="fr-FR" dirty="0"/>
+              <a:t>Test de la fonction « </a:t>
+            </a:r>
+            <a:r>
+              <a:rPr lang="fr-FR" dirty="0" err="1">
+                <a:latin typeface="Courier New" panose="02070309020205020404" pitchFamily="49" charset="0"/>
+                <a:cs typeface="Courier New" panose="02070309020205020404" pitchFamily="49" charset="0"/>
+              </a:rPr>
+              <a:t>toLayout</a:t>
+            </a:r>
+            <a:r>
+              <a:rPr lang="fr-FR" dirty="0"/>
+              <a:t> » de la classe « </a:t>
+            </a:r>
+            <a:r>
+              <a:rPr lang="fr-FR" dirty="0" err="1">
+                <a:latin typeface="Courier New" panose="02070309020205020404" pitchFamily="49" charset="0"/>
+                <a:cs typeface="Courier New" panose="02070309020205020404" pitchFamily="49" charset="0"/>
+              </a:rPr>
+              <a:t>CHardware</a:t>
+            </a:r>
+            <a:r>
+              <a:rPr lang="fr-FR" dirty="0"/>
+              <a:t> » :</a:t>
+            </a:r>
+          </a:p>
+        </p:txBody>
+      </p:sp>
+      <p:sp>
+        <p:nvSpPr>
+          <p:cNvPr id="9" name="ZoneTexte 8">
+            <a:extLst>
+              <a:ext uri="{FF2B5EF4-FFF2-40B4-BE49-F238E27FC236}">
+                <a16:creationId xmlns:a16="http://schemas.microsoft.com/office/drawing/2014/main" id="{963F2B3A-D11E-4533-9ADD-03A530196E6E}"/>
+              </a:ext>
+            </a:extLst>
+          </p:cNvPr>
+          <p:cNvSpPr txBox="1"/>
+          <p:nvPr/>
+        </p:nvSpPr>
+        <p:spPr>
+          <a:xfrm>
+            <a:off x="9079897" y="6198657"/>
+            <a:ext cx="1735540" cy="369332"/>
+          </a:xfrm>
+          <a:prstGeom prst="rect">
+            <a:avLst/>
+          </a:prstGeom>
+          <a:noFill/>
+        </p:spPr>
+        <p:txBody>
+          <a:bodyPr wrap="none" rtlCol="0">
+            <a:spAutoFit/>
+          </a:bodyPr>
+          <a:lstStyle/>
+          <a:p>
+            <a:r>
+              <a:rPr lang="fr-FR" i="1" dirty="0">
+                <a:solidFill>
+                  <a:schemeClr val="tx1">
+                    <a:lumMod val="50000"/>
+                    <a:lumOff val="50000"/>
+                  </a:schemeClr>
+                </a:solidFill>
+              </a:rPr>
+              <a:t>Résultat attendu</a:t>
+            </a:r>
+          </a:p>
+        </p:txBody>
+      </p:sp>
+      <p:sp>
+        <p:nvSpPr>
+          <p:cNvPr id="11" name="ZoneTexte 10">
+            <a:extLst>
+              <a:ext uri="{FF2B5EF4-FFF2-40B4-BE49-F238E27FC236}">
+                <a16:creationId xmlns:a16="http://schemas.microsoft.com/office/drawing/2014/main" id="{F703DA31-DFF1-4478-9E4F-EEAAB74FE049}"/>
+              </a:ext>
+            </a:extLst>
+          </p:cNvPr>
+          <p:cNvSpPr txBox="1"/>
+          <p:nvPr/>
+        </p:nvSpPr>
+        <p:spPr>
+          <a:xfrm>
+            <a:off x="738231" y="3269450"/>
+            <a:ext cx="6829482" cy="1477328"/>
+          </a:xfrm>
+          <a:prstGeom prst="rect">
+            <a:avLst/>
+          </a:prstGeom>
+          <a:noFill/>
+        </p:spPr>
+        <p:txBody>
+          <a:bodyPr wrap="square" rtlCol="0">
+            <a:spAutoFit/>
+          </a:bodyPr>
+          <a:lstStyle/>
+          <a:p>
+            <a:pPr marL="285750" indent="-285750">
+              <a:buFont typeface="Arial" panose="020B0604020202020204" pitchFamily="34" charset="0"/>
+              <a:buChar char="•"/>
+            </a:pPr>
+            <a:r>
+              <a:rPr lang="fr-FR" dirty="0"/>
+              <a:t>Ouvrir l’application sur le smartphone Android</a:t>
+            </a:r>
+          </a:p>
+          <a:p>
+            <a:pPr marL="285750" indent="-285750">
+              <a:buFont typeface="Arial" panose="020B0604020202020204" pitchFamily="34" charset="0"/>
+              <a:buChar char="•"/>
+            </a:pPr>
+            <a:r>
+              <a:rPr lang="fr-FR" dirty="0"/>
+              <a:t>Renseigner l’adresse IP du serveur, cliquer sur « Connexion »</a:t>
+            </a:r>
+          </a:p>
+          <a:p>
+            <a:pPr marL="285750" indent="-285750">
+              <a:buFont typeface="Arial" panose="020B0604020202020204" pitchFamily="34" charset="0"/>
+              <a:buChar char="•"/>
+            </a:pPr>
+            <a:r>
+              <a:rPr lang="fr-FR" dirty="0"/>
+              <a:t>Cliquez sur la tuile « Capteurs »</a:t>
+            </a:r>
+          </a:p>
+          <a:p>
+            <a:pPr marL="285750" indent="-285750">
+              <a:buFont typeface="Arial" panose="020B0604020202020204" pitchFamily="34" charset="0"/>
+              <a:buChar char="•"/>
+            </a:pPr>
+            <a:r>
+              <a:rPr lang="fr-FR" dirty="0"/>
+              <a:t>Vérifier que pour chaque capteur présent dans la base de données, une tuile à été crée. (actuellement 6)</a:t>
+            </a:r>
+          </a:p>
+        </p:txBody>
+      </p:sp>
+    </p:spTree>
+    <p:extLst>
+      <p:ext uri="{BB962C8B-B14F-4D97-AF65-F5344CB8AC3E}">
+        <p14:creationId xmlns:p14="http://schemas.microsoft.com/office/powerpoint/2010/main" val="776727270"/>
       </p:ext>
     </p:extLst>
   </p:cSld>

</xml_diff>